<commit_message>
added exercise for deep learning instance segmentation module
</commit_message>
<xml_diff>
--- a/figures/resources/cellpose_pic.pptx
+++ b/figures/resources/cellpose_pic.pptx
@@ -6,6 +6,7 @@
   </p:sldMasterIdLst>
   <p:sldIdLst>
     <p:sldId id="260" r:id="rId2"/>
+    <p:sldId id="261" r:id="rId3"/>
   </p:sldIdLst>
   <p:sldSz cx="12192000" cy="6858000"/>
   <p:notesSz cx="6858000" cy="9144000"/>
@@ -261,7 +262,7 @@
           <a:p>
             <a:fld id="{783D4129-6E14-4DEB-A88B-FA76BDE6DE9E}" type="datetimeFigureOut">
               <a:rPr lang="en-DE" smtClean="0"/>
-              <a:t>20/10/2022</a:t>
+              <a:t>21/10/2022</a:t>
             </a:fld>
             <a:endParaRPr lang="en-DE"/>
           </a:p>
@@ -461,7 +462,7 @@
           <a:p>
             <a:fld id="{783D4129-6E14-4DEB-A88B-FA76BDE6DE9E}" type="datetimeFigureOut">
               <a:rPr lang="en-DE" smtClean="0"/>
-              <a:t>20/10/2022</a:t>
+              <a:t>21/10/2022</a:t>
             </a:fld>
             <a:endParaRPr lang="en-DE"/>
           </a:p>
@@ -671,7 +672,7 @@
           <a:p>
             <a:fld id="{783D4129-6E14-4DEB-A88B-FA76BDE6DE9E}" type="datetimeFigureOut">
               <a:rPr lang="en-DE" smtClean="0"/>
-              <a:t>20/10/2022</a:t>
+              <a:t>21/10/2022</a:t>
             </a:fld>
             <a:endParaRPr lang="en-DE"/>
           </a:p>
@@ -871,7 +872,7 @@
           <a:p>
             <a:fld id="{783D4129-6E14-4DEB-A88B-FA76BDE6DE9E}" type="datetimeFigureOut">
               <a:rPr lang="en-DE" smtClean="0"/>
-              <a:t>20/10/2022</a:t>
+              <a:t>21/10/2022</a:t>
             </a:fld>
             <a:endParaRPr lang="en-DE"/>
           </a:p>
@@ -1147,7 +1148,7 @@
           <a:p>
             <a:fld id="{783D4129-6E14-4DEB-A88B-FA76BDE6DE9E}" type="datetimeFigureOut">
               <a:rPr lang="en-DE" smtClean="0"/>
-              <a:t>20/10/2022</a:t>
+              <a:t>21/10/2022</a:t>
             </a:fld>
             <a:endParaRPr lang="en-DE"/>
           </a:p>
@@ -1415,7 +1416,7 @@
           <a:p>
             <a:fld id="{783D4129-6E14-4DEB-A88B-FA76BDE6DE9E}" type="datetimeFigureOut">
               <a:rPr lang="en-DE" smtClean="0"/>
-              <a:t>20/10/2022</a:t>
+              <a:t>21/10/2022</a:t>
             </a:fld>
             <a:endParaRPr lang="en-DE"/>
           </a:p>
@@ -1830,7 +1831,7 @@
           <a:p>
             <a:fld id="{783D4129-6E14-4DEB-A88B-FA76BDE6DE9E}" type="datetimeFigureOut">
               <a:rPr lang="en-DE" smtClean="0"/>
-              <a:t>20/10/2022</a:t>
+              <a:t>21/10/2022</a:t>
             </a:fld>
             <a:endParaRPr lang="en-DE"/>
           </a:p>
@@ -1972,7 +1973,7 @@
           <a:p>
             <a:fld id="{783D4129-6E14-4DEB-A88B-FA76BDE6DE9E}" type="datetimeFigureOut">
               <a:rPr lang="en-DE" smtClean="0"/>
-              <a:t>20/10/2022</a:t>
+              <a:t>21/10/2022</a:t>
             </a:fld>
             <a:endParaRPr lang="en-DE"/>
           </a:p>
@@ -2085,7 +2086,7 @@
           <a:p>
             <a:fld id="{783D4129-6E14-4DEB-A88B-FA76BDE6DE9E}" type="datetimeFigureOut">
               <a:rPr lang="en-DE" smtClean="0"/>
-              <a:t>20/10/2022</a:t>
+              <a:t>21/10/2022</a:t>
             </a:fld>
             <a:endParaRPr lang="en-DE"/>
           </a:p>
@@ -2398,7 +2399,7 @@
           <a:p>
             <a:fld id="{783D4129-6E14-4DEB-A88B-FA76BDE6DE9E}" type="datetimeFigureOut">
               <a:rPr lang="en-DE" smtClean="0"/>
-              <a:t>20/10/2022</a:t>
+              <a:t>21/10/2022</a:t>
             </a:fld>
             <a:endParaRPr lang="en-DE"/>
           </a:p>
@@ -2687,7 +2688,7 @@
           <a:p>
             <a:fld id="{783D4129-6E14-4DEB-A88B-FA76BDE6DE9E}" type="datetimeFigureOut">
               <a:rPr lang="en-DE" smtClean="0"/>
-              <a:t>20/10/2022</a:t>
+              <a:t>21/10/2022</a:t>
             </a:fld>
             <a:endParaRPr lang="en-DE"/>
           </a:p>
@@ -2930,7 +2931,7 @@
           <a:p>
             <a:fld id="{783D4129-6E14-4DEB-A88B-FA76BDE6DE9E}" type="datetimeFigureOut">
               <a:rPr lang="en-DE" smtClean="0"/>
-              <a:t>20/10/2022</a:t>
+              <a:t>21/10/2022</a:t>
             </a:fld>
             <a:endParaRPr lang="en-DE"/>
           </a:p>
@@ -4609,6 +4610,1931 @@
 </p:sld>
 </file>
 
+<file path=ppt/slides/slide2.xml><?xml version="1.0" encoding="utf-8"?>
+<p:sld xmlns:a="http://schemas.openxmlformats.org/drawingml/2006/main" xmlns:r="http://schemas.openxmlformats.org/officeDocument/2006/relationships" xmlns:p="http://schemas.openxmlformats.org/presentationml/2006/main">
+  <p:cSld>
+    <p:spTree>
+      <p:nvGrpSpPr>
+        <p:cNvPr id="1" name=""/>
+        <p:cNvGrpSpPr/>
+        <p:nvPr/>
+      </p:nvGrpSpPr>
+      <p:grpSpPr>
+        <a:xfrm>
+          <a:off x="0" y="0"/>
+          <a:ext cx="0" cy="0"/>
+          <a:chOff x="0" y="0"/>
+          <a:chExt cx="0" cy="0"/>
+        </a:xfrm>
+      </p:grpSpPr>
+      <p:grpSp>
+        <p:nvGrpSpPr>
+          <p:cNvPr id="20" name="Group 19">
+            <a:extLst>
+              <a:ext uri="{FF2B5EF4-FFF2-40B4-BE49-F238E27FC236}">
+                <a16:creationId xmlns:a16="http://schemas.microsoft.com/office/drawing/2014/main" id="{3E547BE4-8B88-4FB4-B1E9-78712631C677}"/>
+              </a:ext>
+            </a:extLst>
+          </p:cNvPr>
+          <p:cNvGrpSpPr/>
+          <p:nvPr/>
+        </p:nvGrpSpPr>
+        <p:grpSpPr>
+          <a:xfrm>
+            <a:off x="1432724" y="1695782"/>
+            <a:ext cx="4244176" cy="3727118"/>
+            <a:chOff x="1432724" y="1695782"/>
+            <a:chExt cx="4244176" cy="3727118"/>
+          </a:xfrm>
+        </p:grpSpPr>
+        <p:pic>
+          <p:nvPicPr>
+            <p:cNvPr id="17" name="Picture 16">
+              <a:extLst>
+                <a:ext uri="{FF2B5EF4-FFF2-40B4-BE49-F238E27FC236}">
+                  <a16:creationId xmlns:a16="http://schemas.microsoft.com/office/drawing/2014/main" id="{0C83DD54-DDE8-4079-A8E2-0F3F62B64BB0}"/>
+                </a:ext>
+              </a:extLst>
+            </p:cNvPr>
+            <p:cNvPicPr>
+              <a:picLocks noChangeAspect="1"/>
+            </p:cNvPicPr>
+            <p:nvPr/>
+          </p:nvPicPr>
+          <p:blipFill>
+            <a:blip r:embed="rId2"/>
+            <a:stretch>
+              <a:fillRect/>
+            </a:stretch>
+          </p:blipFill>
+          <p:spPr>
+            <a:xfrm>
+              <a:off x="1432724" y="1695782"/>
+              <a:ext cx="4244176" cy="3727118"/>
+            </a:xfrm>
+            <a:prstGeom prst="rect">
+              <a:avLst/>
+            </a:prstGeom>
+          </p:spPr>
+        </p:pic>
+        <p:sp>
+          <p:nvSpPr>
+            <p:cNvPr id="13" name="Freeform: Shape 12">
+              <a:extLst>
+                <a:ext uri="{FF2B5EF4-FFF2-40B4-BE49-F238E27FC236}">
+                  <a16:creationId xmlns:a16="http://schemas.microsoft.com/office/drawing/2014/main" id="{68CBAA18-9834-4A52-8334-7CBBE815E30C}"/>
+                </a:ext>
+              </a:extLst>
+            </p:cNvPr>
+            <p:cNvSpPr/>
+            <p:nvPr/>
+          </p:nvSpPr>
+          <p:spPr>
+            <a:xfrm>
+              <a:off x="4906433" y="2815166"/>
+              <a:ext cx="770467" cy="1308100"/>
+            </a:xfrm>
+            <a:custGeom>
+              <a:avLst/>
+              <a:gdLst>
+                <a:gd name="connsiteX0" fmla="*/ 1086549 w 1218556"/>
+                <a:gd name="connsiteY0" fmla="*/ 461434 h 1388534"/>
+                <a:gd name="connsiteX1" fmla="*/ 1044216 w 1218556"/>
+                <a:gd name="connsiteY1" fmla="*/ 325967 h 1388534"/>
+                <a:gd name="connsiteX2" fmla="*/ 984949 w 1218556"/>
+                <a:gd name="connsiteY2" fmla="*/ 224367 h 1388534"/>
+                <a:gd name="connsiteX3" fmla="*/ 955316 w 1218556"/>
+                <a:gd name="connsiteY3" fmla="*/ 182034 h 1388534"/>
+                <a:gd name="connsiteX4" fmla="*/ 760583 w 1218556"/>
+                <a:gd name="connsiteY4" fmla="*/ 63500 h 1388534"/>
+                <a:gd name="connsiteX5" fmla="*/ 603949 w 1218556"/>
+                <a:gd name="connsiteY5" fmla="*/ 21167 h 1388534"/>
+                <a:gd name="connsiteX6" fmla="*/ 464249 w 1218556"/>
+                <a:gd name="connsiteY6" fmla="*/ 0 h 1388534"/>
+                <a:gd name="connsiteX7" fmla="*/ 396516 w 1218556"/>
+                <a:gd name="connsiteY7" fmla="*/ 8467 h 1388534"/>
+                <a:gd name="connsiteX8" fmla="*/ 328783 w 1218556"/>
+                <a:gd name="connsiteY8" fmla="*/ 29634 h 1388534"/>
+                <a:gd name="connsiteX9" fmla="*/ 265283 w 1218556"/>
+                <a:gd name="connsiteY9" fmla="*/ 46567 h 1388534"/>
+                <a:gd name="connsiteX10" fmla="*/ 218716 w 1218556"/>
+                <a:gd name="connsiteY10" fmla="*/ 71967 h 1388534"/>
+                <a:gd name="connsiteX11" fmla="*/ 70549 w 1218556"/>
+                <a:gd name="connsiteY11" fmla="*/ 207434 h 1388534"/>
+                <a:gd name="connsiteX12" fmla="*/ 11283 w 1218556"/>
+                <a:gd name="connsiteY12" fmla="*/ 355600 h 1388534"/>
+                <a:gd name="connsiteX13" fmla="*/ 11283 w 1218556"/>
+                <a:gd name="connsiteY13" fmla="*/ 613834 h 1388534"/>
+                <a:gd name="connsiteX14" fmla="*/ 28216 w 1218556"/>
+                <a:gd name="connsiteY14" fmla="*/ 677334 h 1388534"/>
+                <a:gd name="connsiteX15" fmla="*/ 70549 w 1218556"/>
+                <a:gd name="connsiteY15" fmla="*/ 795867 h 1388534"/>
+                <a:gd name="connsiteX16" fmla="*/ 95949 w 1218556"/>
+                <a:gd name="connsiteY16" fmla="*/ 850900 h 1388534"/>
+                <a:gd name="connsiteX17" fmla="*/ 112883 w 1218556"/>
+                <a:gd name="connsiteY17" fmla="*/ 918634 h 1388534"/>
+                <a:gd name="connsiteX18" fmla="*/ 150983 w 1218556"/>
+                <a:gd name="connsiteY18" fmla="*/ 1011767 h 1388534"/>
+                <a:gd name="connsiteX19" fmla="*/ 197549 w 1218556"/>
+                <a:gd name="connsiteY19" fmla="*/ 1104900 h 1388534"/>
+                <a:gd name="connsiteX20" fmla="*/ 222949 w 1218556"/>
+                <a:gd name="connsiteY20" fmla="*/ 1138767 h 1388534"/>
+                <a:gd name="connsiteX21" fmla="*/ 294916 w 1218556"/>
+                <a:gd name="connsiteY21" fmla="*/ 1244600 h 1388534"/>
+                <a:gd name="connsiteX22" fmla="*/ 341483 w 1218556"/>
+                <a:gd name="connsiteY22" fmla="*/ 1282700 h 1388534"/>
+                <a:gd name="connsiteX23" fmla="*/ 383816 w 1218556"/>
+                <a:gd name="connsiteY23" fmla="*/ 1325034 h 1388534"/>
+                <a:gd name="connsiteX24" fmla="*/ 472716 w 1218556"/>
+                <a:gd name="connsiteY24" fmla="*/ 1375834 h 1388534"/>
+                <a:gd name="connsiteX25" fmla="*/ 536216 w 1218556"/>
+                <a:gd name="connsiteY25" fmla="*/ 1388534 h 1388534"/>
+                <a:gd name="connsiteX26" fmla="*/ 692849 w 1218556"/>
+                <a:gd name="connsiteY26" fmla="*/ 1384300 h 1388534"/>
+                <a:gd name="connsiteX27" fmla="*/ 828316 w 1218556"/>
+                <a:gd name="connsiteY27" fmla="*/ 1354667 h 1388534"/>
+                <a:gd name="connsiteX28" fmla="*/ 976483 w 1218556"/>
+                <a:gd name="connsiteY28" fmla="*/ 1270000 h 1388534"/>
+                <a:gd name="connsiteX29" fmla="*/ 1120416 w 1218556"/>
+                <a:gd name="connsiteY29" fmla="*/ 1130300 h 1388534"/>
+                <a:gd name="connsiteX30" fmla="*/ 1166983 w 1218556"/>
+                <a:gd name="connsiteY30" fmla="*/ 1066800 h 1388534"/>
+                <a:gd name="connsiteX31" fmla="*/ 1179683 w 1218556"/>
+                <a:gd name="connsiteY31" fmla="*/ 1045634 h 1388534"/>
+                <a:gd name="connsiteX32" fmla="*/ 1213549 w 1218556"/>
+                <a:gd name="connsiteY32" fmla="*/ 910167 h 1388534"/>
+                <a:gd name="connsiteX33" fmla="*/ 1213549 w 1218556"/>
+                <a:gd name="connsiteY33" fmla="*/ 745067 h 1388534"/>
+                <a:gd name="connsiteX34" fmla="*/ 1200849 w 1218556"/>
+                <a:gd name="connsiteY34" fmla="*/ 715434 h 1388534"/>
+                <a:gd name="connsiteX35" fmla="*/ 1183916 w 1218556"/>
+                <a:gd name="connsiteY35" fmla="*/ 660400 h 1388534"/>
+                <a:gd name="connsiteX36" fmla="*/ 1158516 w 1218556"/>
+                <a:gd name="connsiteY36" fmla="*/ 601134 h 1388534"/>
+                <a:gd name="connsiteX37" fmla="*/ 1133116 w 1218556"/>
+                <a:gd name="connsiteY37" fmla="*/ 558800 h 1388534"/>
+                <a:gd name="connsiteX38" fmla="*/ 1103483 w 1218556"/>
+                <a:gd name="connsiteY38" fmla="*/ 478367 h 1388534"/>
+                <a:gd name="connsiteX39" fmla="*/ 1086549 w 1218556"/>
+                <a:gd name="connsiteY39" fmla="*/ 461434 h 1388534"/>
+              </a:gdLst>
+              <a:ahLst/>
+              <a:cxnLst>
+                <a:cxn ang="0">
+                  <a:pos x="connsiteX0" y="connsiteY0"/>
+                </a:cxn>
+                <a:cxn ang="0">
+                  <a:pos x="connsiteX1" y="connsiteY1"/>
+                </a:cxn>
+                <a:cxn ang="0">
+                  <a:pos x="connsiteX2" y="connsiteY2"/>
+                </a:cxn>
+                <a:cxn ang="0">
+                  <a:pos x="connsiteX3" y="connsiteY3"/>
+                </a:cxn>
+                <a:cxn ang="0">
+                  <a:pos x="connsiteX4" y="connsiteY4"/>
+                </a:cxn>
+                <a:cxn ang="0">
+                  <a:pos x="connsiteX5" y="connsiteY5"/>
+                </a:cxn>
+                <a:cxn ang="0">
+                  <a:pos x="connsiteX6" y="connsiteY6"/>
+                </a:cxn>
+                <a:cxn ang="0">
+                  <a:pos x="connsiteX7" y="connsiteY7"/>
+                </a:cxn>
+                <a:cxn ang="0">
+                  <a:pos x="connsiteX8" y="connsiteY8"/>
+                </a:cxn>
+                <a:cxn ang="0">
+                  <a:pos x="connsiteX9" y="connsiteY9"/>
+                </a:cxn>
+                <a:cxn ang="0">
+                  <a:pos x="connsiteX10" y="connsiteY10"/>
+                </a:cxn>
+                <a:cxn ang="0">
+                  <a:pos x="connsiteX11" y="connsiteY11"/>
+                </a:cxn>
+                <a:cxn ang="0">
+                  <a:pos x="connsiteX12" y="connsiteY12"/>
+                </a:cxn>
+                <a:cxn ang="0">
+                  <a:pos x="connsiteX13" y="connsiteY13"/>
+                </a:cxn>
+                <a:cxn ang="0">
+                  <a:pos x="connsiteX14" y="connsiteY14"/>
+                </a:cxn>
+                <a:cxn ang="0">
+                  <a:pos x="connsiteX15" y="connsiteY15"/>
+                </a:cxn>
+                <a:cxn ang="0">
+                  <a:pos x="connsiteX16" y="connsiteY16"/>
+                </a:cxn>
+                <a:cxn ang="0">
+                  <a:pos x="connsiteX17" y="connsiteY17"/>
+                </a:cxn>
+                <a:cxn ang="0">
+                  <a:pos x="connsiteX18" y="connsiteY18"/>
+                </a:cxn>
+                <a:cxn ang="0">
+                  <a:pos x="connsiteX19" y="connsiteY19"/>
+                </a:cxn>
+                <a:cxn ang="0">
+                  <a:pos x="connsiteX20" y="connsiteY20"/>
+                </a:cxn>
+                <a:cxn ang="0">
+                  <a:pos x="connsiteX21" y="connsiteY21"/>
+                </a:cxn>
+                <a:cxn ang="0">
+                  <a:pos x="connsiteX22" y="connsiteY22"/>
+                </a:cxn>
+                <a:cxn ang="0">
+                  <a:pos x="connsiteX23" y="connsiteY23"/>
+                </a:cxn>
+                <a:cxn ang="0">
+                  <a:pos x="connsiteX24" y="connsiteY24"/>
+                </a:cxn>
+                <a:cxn ang="0">
+                  <a:pos x="connsiteX25" y="connsiteY25"/>
+                </a:cxn>
+                <a:cxn ang="0">
+                  <a:pos x="connsiteX26" y="connsiteY26"/>
+                </a:cxn>
+                <a:cxn ang="0">
+                  <a:pos x="connsiteX27" y="connsiteY27"/>
+                </a:cxn>
+                <a:cxn ang="0">
+                  <a:pos x="connsiteX28" y="connsiteY28"/>
+                </a:cxn>
+                <a:cxn ang="0">
+                  <a:pos x="connsiteX29" y="connsiteY29"/>
+                </a:cxn>
+                <a:cxn ang="0">
+                  <a:pos x="connsiteX30" y="connsiteY30"/>
+                </a:cxn>
+                <a:cxn ang="0">
+                  <a:pos x="connsiteX31" y="connsiteY31"/>
+                </a:cxn>
+                <a:cxn ang="0">
+                  <a:pos x="connsiteX32" y="connsiteY32"/>
+                </a:cxn>
+                <a:cxn ang="0">
+                  <a:pos x="connsiteX33" y="connsiteY33"/>
+                </a:cxn>
+                <a:cxn ang="0">
+                  <a:pos x="connsiteX34" y="connsiteY34"/>
+                </a:cxn>
+                <a:cxn ang="0">
+                  <a:pos x="connsiteX35" y="connsiteY35"/>
+                </a:cxn>
+                <a:cxn ang="0">
+                  <a:pos x="connsiteX36" y="connsiteY36"/>
+                </a:cxn>
+                <a:cxn ang="0">
+                  <a:pos x="connsiteX37" y="connsiteY37"/>
+                </a:cxn>
+                <a:cxn ang="0">
+                  <a:pos x="connsiteX38" y="connsiteY38"/>
+                </a:cxn>
+                <a:cxn ang="0">
+                  <a:pos x="connsiteX39" y="connsiteY39"/>
+                </a:cxn>
+              </a:cxnLst>
+              <a:rect l="l" t="t" r="r" b="b"/>
+              <a:pathLst>
+                <a:path w="1218556" h="1388534">
+                  <a:moveTo>
+                    <a:pt x="1086549" y="461434"/>
+                  </a:moveTo>
+                  <a:cubicBezTo>
+                    <a:pt x="1076671" y="436034"/>
+                    <a:pt x="1096400" y="432422"/>
+                    <a:pt x="1044216" y="325967"/>
+                  </a:cubicBezTo>
+                  <a:cubicBezTo>
+                    <a:pt x="1026958" y="290762"/>
+                    <a:pt x="1005552" y="257725"/>
+                    <a:pt x="984949" y="224367"/>
+                  </a:cubicBezTo>
+                  <a:cubicBezTo>
+                    <a:pt x="975898" y="209712"/>
+                    <a:pt x="968548" y="193061"/>
+                    <a:pt x="955316" y="182034"/>
+                  </a:cubicBezTo>
+                  <a:cubicBezTo>
+                    <a:pt x="892404" y="129607"/>
+                    <a:pt x="833965" y="93311"/>
+                    <a:pt x="760583" y="63500"/>
+                  </a:cubicBezTo>
+                  <a:cubicBezTo>
+                    <a:pt x="708925" y="42514"/>
+                    <a:pt x="658846" y="32657"/>
+                    <a:pt x="603949" y="21167"/>
+                  </a:cubicBezTo>
+                  <a:cubicBezTo>
+                    <a:pt x="514142" y="2370"/>
+                    <a:pt x="536219" y="5998"/>
+                    <a:pt x="464249" y="0"/>
+                  </a:cubicBezTo>
+                  <a:cubicBezTo>
+                    <a:pt x="441671" y="2822"/>
+                    <a:pt x="418744" y="3605"/>
+                    <a:pt x="396516" y="8467"/>
+                  </a:cubicBezTo>
+                  <a:cubicBezTo>
+                    <a:pt x="373408" y="13522"/>
+                    <a:pt x="351499" y="23039"/>
+                    <a:pt x="328783" y="29634"/>
+                  </a:cubicBezTo>
+                  <a:cubicBezTo>
+                    <a:pt x="307745" y="35742"/>
+                    <a:pt x="286450" y="40923"/>
+                    <a:pt x="265283" y="46567"/>
+                  </a:cubicBezTo>
+                  <a:cubicBezTo>
+                    <a:pt x="249761" y="55034"/>
+                    <a:pt x="233355" y="62051"/>
+                    <a:pt x="218716" y="71967"/>
+                  </a:cubicBezTo>
+                  <a:cubicBezTo>
+                    <a:pt x="158556" y="112721"/>
+                    <a:pt x="111955" y="147050"/>
+                    <a:pt x="70549" y="207434"/>
+                  </a:cubicBezTo>
+                  <a:cubicBezTo>
+                    <a:pt x="35014" y="259256"/>
+                    <a:pt x="28357" y="297548"/>
+                    <a:pt x="11283" y="355600"/>
+                  </a:cubicBezTo>
+                  <a:cubicBezTo>
+                    <a:pt x="-2712" y="467560"/>
+                    <a:pt x="-4775" y="453250"/>
+                    <a:pt x="11283" y="613834"/>
+                  </a:cubicBezTo>
+                  <a:cubicBezTo>
+                    <a:pt x="13463" y="635632"/>
+                    <a:pt x="21434" y="656504"/>
+                    <a:pt x="28216" y="677334"/>
+                  </a:cubicBezTo>
+                  <a:cubicBezTo>
+                    <a:pt x="41205" y="717228"/>
+                    <a:pt x="52967" y="757773"/>
+                    <a:pt x="70549" y="795867"/>
+                  </a:cubicBezTo>
+                  <a:cubicBezTo>
+                    <a:pt x="79016" y="814211"/>
+                    <a:pt x="89363" y="831800"/>
+                    <a:pt x="95949" y="850900"/>
+                  </a:cubicBezTo>
+                  <a:cubicBezTo>
+                    <a:pt x="103536" y="872902"/>
+                    <a:pt x="105985" y="896407"/>
+                    <a:pt x="112883" y="918634"/>
+                  </a:cubicBezTo>
+                  <a:cubicBezTo>
+                    <a:pt x="119368" y="939531"/>
+                    <a:pt x="139975" y="989018"/>
+                    <a:pt x="150983" y="1011767"/>
+                  </a:cubicBezTo>
+                  <a:cubicBezTo>
+                    <a:pt x="166101" y="1043010"/>
+                    <a:pt x="176724" y="1077133"/>
+                    <a:pt x="197549" y="1104900"/>
+                  </a:cubicBezTo>
+                  <a:cubicBezTo>
+                    <a:pt x="206016" y="1116189"/>
+                    <a:pt x="215259" y="1126936"/>
+                    <a:pt x="222949" y="1138767"/>
+                  </a:cubicBezTo>
+                  <a:cubicBezTo>
+                    <a:pt x="255391" y="1188677"/>
+                    <a:pt x="251083" y="1198680"/>
+                    <a:pt x="294916" y="1244600"/>
+                  </a:cubicBezTo>
+                  <a:cubicBezTo>
+                    <a:pt x="308764" y="1259107"/>
+                    <a:pt x="326611" y="1269244"/>
+                    <a:pt x="341483" y="1282700"/>
+                  </a:cubicBezTo>
+                  <a:cubicBezTo>
+                    <a:pt x="356281" y="1296089"/>
+                    <a:pt x="368305" y="1312478"/>
+                    <a:pt x="383816" y="1325034"/>
+                  </a:cubicBezTo>
+                  <a:cubicBezTo>
+                    <a:pt x="397300" y="1335950"/>
+                    <a:pt x="453708" y="1369752"/>
+                    <a:pt x="472716" y="1375834"/>
+                  </a:cubicBezTo>
+                  <a:cubicBezTo>
+                    <a:pt x="493275" y="1382413"/>
+                    <a:pt x="515049" y="1384301"/>
+                    <a:pt x="536216" y="1388534"/>
+                  </a:cubicBezTo>
+                  <a:cubicBezTo>
+                    <a:pt x="588427" y="1387123"/>
+                    <a:pt x="640717" y="1387492"/>
+                    <a:pt x="692849" y="1384300"/>
+                  </a:cubicBezTo>
+                  <a:cubicBezTo>
+                    <a:pt x="722617" y="1382477"/>
+                    <a:pt x="811262" y="1360636"/>
+                    <a:pt x="828316" y="1354667"/>
+                  </a:cubicBezTo>
+                  <a:cubicBezTo>
+                    <a:pt x="899127" y="1329883"/>
+                    <a:pt x="920079" y="1314439"/>
+                    <a:pt x="976483" y="1270000"/>
+                  </a:cubicBezTo>
+                  <a:cubicBezTo>
+                    <a:pt x="1048551" y="1213219"/>
+                    <a:pt x="1061798" y="1201944"/>
+                    <a:pt x="1120416" y="1130300"/>
+                  </a:cubicBezTo>
+                  <a:cubicBezTo>
+                    <a:pt x="1137037" y="1109985"/>
+                    <a:pt x="1151930" y="1088303"/>
+                    <a:pt x="1166983" y="1066800"/>
+                  </a:cubicBezTo>
+                  <a:cubicBezTo>
+                    <a:pt x="1171701" y="1060059"/>
+                    <a:pt x="1176235" y="1053105"/>
+                    <a:pt x="1179683" y="1045634"/>
+                  </a:cubicBezTo>
+                  <a:cubicBezTo>
+                    <a:pt x="1199371" y="1002976"/>
+                    <a:pt x="1205912" y="955995"/>
+                    <a:pt x="1213549" y="910167"/>
+                  </a:cubicBezTo>
+                  <a:cubicBezTo>
+                    <a:pt x="1217751" y="847151"/>
+                    <a:pt x="1222321" y="813048"/>
+                    <a:pt x="1213549" y="745067"/>
+                  </a:cubicBezTo>
+                  <a:cubicBezTo>
+                    <a:pt x="1212174" y="734409"/>
+                    <a:pt x="1204707" y="725464"/>
+                    <a:pt x="1200849" y="715434"/>
+                  </a:cubicBezTo>
+                  <a:cubicBezTo>
+                    <a:pt x="1188998" y="684619"/>
+                    <a:pt x="1194993" y="693629"/>
+                    <a:pt x="1183916" y="660400"/>
+                  </a:cubicBezTo>
+                  <a:cubicBezTo>
+                    <a:pt x="1176452" y="638009"/>
+                    <a:pt x="1169887" y="621349"/>
+                    <a:pt x="1158516" y="601134"/>
+                  </a:cubicBezTo>
+                  <a:cubicBezTo>
+                    <a:pt x="1150448" y="586791"/>
+                    <a:pt x="1133116" y="558800"/>
+                    <a:pt x="1133116" y="558800"/>
+                  </a:cubicBezTo>
+                  <a:cubicBezTo>
+                    <a:pt x="1125718" y="521809"/>
+                    <a:pt x="1128580" y="528561"/>
+                    <a:pt x="1103483" y="478367"/>
+                  </a:cubicBezTo>
+                  <a:cubicBezTo>
+                    <a:pt x="1089372" y="450145"/>
+                    <a:pt x="1096427" y="486834"/>
+                    <a:pt x="1086549" y="461434"/>
+                  </a:cubicBezTo>
+                  <a:close/>
+                </a:path>
+              </a:pathLst>
+            </a:custGeom>
+            <a:noFill/>
+            <a:ln w="38100">
+              <a:solidFill>
+                <a:srgbClr val="FFFF00"/>
+              </a:solidFill>
+            </a:ln>
+          </p:spPr>
+          <p:style>
+            <a:lnRef idx="2">
+              <a:schemeClr val="accent1">
+                <a:shade val="50000"/>
+              </a:schemeClr>
+            </a:lnRef>
+            <a:fillRef idx="1">
+              <a:schemeClr val="accent1"/>
+            </a:fillRef>
+            <a:effectRef idx="0">
+              <a:schemeClr val="accent1"/>
+            </a:effectRef>
+            <a:fontRef idx="minor">
+              <a:schemeClr val="lt1"/>
+            </a:fontRef>
+          </p:style>
+          <p:txBody>
+            <a:bodyPr rtlCol="0" anchor="ctr"/>
+            <a:lstStyle/>
+            <a:p>
+              <a:pPr algn="ctr"/>
+              <a:endParaRPr lang="en-DE"/>
+            </a:p>
+          </p:txBody>
+        </p:sp>
+        <p:sp>
+          <p:nvSpPr>
+            <p:cNvPr id="14" name="Freeform: Shape 13">
+              <a:extLst>
+                <a:ext uri="{FF2B5EF4-FFF2-40B4-BE49-F238E27FC236}">
+                  <a16:creationId xmlns:a16="http://schemas.microsoft.com/office/drawing/2014/main" id="{18F3A411-C374-4E49-97A9-3A2561805176}"/>
+                </a:ext>
+              </a:extLst>
+            </p:cNvPr>
+            <p:cNvSpPr/>
+            <p:nvPr/>
+          </p:nvSpPr>
+          <p:spPr>
+            <a:xfrm>
+              <a:off x="1938867" y="4271432"/>
+              <a:ext cx="694267" cy="1083735"/>
+            </a:xfrm>
+            <a:custGeom>
+              <a:avLst/>
+              <a:gdLst>
+                <a:gd name="connsiteX0" fmla="*/ 1086549 w 1218556"/>
+                <a:gd name="connsiteY0" fmla="*/ 461434 h 1388534"/>
+                <a:gd name="connsiteX1" fmla="*/ 1044216 w 1218556"/>
+                <a:gd name="connsiteY1" fmla="*/ 325967 h 1388534"/>
+                <a:gd name="connsiteX2" fmla="*/ 984949 w 1218556"/>
+                <a:gd name="connsiteY2" fmla="*/ 224367 h 1388534"/>
+                <a:gd name="connsiteX3" fmla="*/ 955316 w 1218556"/>
+                <a:gd name="connsiteY3" fmla="*/ 182034 h 1388534"/>
+                <a:gd name="connsiteX4" fmla="*/ 760583 w 1218556"/>
+                <a:gd name="connsiteY4" fmla="*/ 63500 h 1388534"/>
+                <a:gd name="connsiteX5" fmla="*/ 603949 w 1218556"/>
+                <a:gd name="connsiteY5" fmla="*/ 21167 h 1388534"/>
+                <a:gd name="connsiteX6" fmla="*/ 464249 w 1218556"/>
+                <a:gd name="connsiteY6" fmla="*/ 0 h 1388534"/>
+                <a:gd name="connsiteX7" fmla="*/ 396516 w 1218556"/>
+                <a:gd name="connsiteY7" fmla="*/ 8467 h 1388534"/>
+                <a:gd name="connsiteX8" fmla="*/ 328783 w 1218556"/>
+                <a:gd name="connsiteY8" fmla="*/ 29634 h 1388534"/>
+                <a:gd name="connsiteX9" fmla="*/ 265283 w 1218556"/>
+                <a:gd name="connsiteY9" fmla="*/ 46567 h 1388534"/>
+                <a:gd name="connsiteX10" fmla="*/ 218716 w 1218556"/>
+                <a:gd name="connsiteY10" fmla="*/ 71967 h 1388534"/>
+                <a:gd name="connsiteX11" fmla="*/ 70549 w 1218556"/>
+                <a:gd name="connsiteY11" fmla="*/ 207434 h 1388534"/>
+                <a:gd name="connsiteX12" fmla="*/ 11283 w 1218556"/>
+                <a:gd name="connsiteY12" fmla="*/ 355600 h 1388534"/>
+                <a:gd name="connsiteX13" fmla="*/ 11283 w 1218556"/>
+                <a:gd name="connsiteY13" fmla="*/ 613834 h 1388534"/>
+                <a:gd name="connsiteX14" fmla="*/ 28216 w 1218556"/>
+                <a:gd name="connsiteY14" fmla="*/ 677334 h 1388534"/>
+                <a:gd name="connsiteX15" fmla="*/ 70549 w 1218556"/>
+                <a:gd name="connsiteY15" fmla="*/ 795867 h 1388534"/>
+                <a:gd name="connsiteX16" fmla="*/ 95949 w 1218556"/>
+                <a:gd name="connsiteY16" fmla="*/ 850900 h 1388534"/>
+                <a:gd name="connsiteX17" fmla="*/ 112883 w 1218556"/>
+                <a:gd name="connsiteY17" fmla="*/ 918634 h 1388534"/>
+                <a:gd name="connsiteX18" fmla="*/ 150983 w 1218556"/>
+                <a:gd name="connsiteY18" fmla="*/ 1011767 h 1388534"/>
+                <a:gd name="connsiteX19" fmla="*/ 197549 w 1218556"/>
+                <a:gd name="connsiteY19" fmla="*/ 1104900 h 1388534"/>
+                <a:gd name="connsiteX20" fmla="*/ 222949 w 1218556"/>
+                <a:gd name="connsiteY20" fmla="*/ 1138767 h 1388534"/>
+                <a:gd name="connsiteX21" fmla="*/ 294916 w 1218556"/>
+                <a:gd name="connsiteY21" fmla="*/ 1244600 h 1388534"/>
+                <a:gd name="connsiteX22" fmla="*/ 341483 w 1218556"/>
+                <a:gd name="connsiteY22" fmla="*/ 1282700 h 1388534"/>
+                <a:gd name="connsiteX23" fmla="*/ 383816 w 1218556"/>
+                <a:gd name="connsiteY23" fmla="*/ 1325034 h 1388534"/>
+                <a:gd name="connsiteX24" fmla="*/ 472716 w 1218556"/>
+                <a:gd name="connsiteY24" fmla="*/ 1375834 h 1388534"/>
+                <a:gd name="connsiteX25" fmla="*/ 536216 w 1218556"/>
+                <a:gd name="connsiteY25" fmla="*/ 1388534 h 1388534"/>
+                <a:gd name="connsiteX26" fmla="*/ 692849 w 1218556"/>
+                <a:gd name="connsiteY26" fmla="*/ 1384300 h 1388534"/>
+                <a:gd name="connsiteX27" fmla="*/ 828316 w 1218556"/>
+                <a:gd name="connsiteY27" fmla="*/ 1354667 h 1388534"/>
+                <a:gd name="connsiteX28" fmla="*/ 976483 w 1218556"/>
+                <a:gd name="connsiteY28" fmla="*/ 1270000 h 1388534"/>
+                <a:gd name="connsiteX29" fmla="*/ 1120416 w 1218556"/>
+                <a:gd name="connsiteY29" fmla="*/ 1130300 h 1388534"/>
+                <a:gd name="connsiteX30" fmla="*/ 1166983 w 1218556"/>
+                <a:gd name="connsiteY30" fmla="*/ 1066800 h 1388534"/>
+                <a:gd name="connsiteX31" fmla="*/ 1179683 w 1218556"/>
+                <a:gd name="connsiteY31" fmla="*/ 1045634 h 1388534"/>
+                <a:gd name="connsiteX32" fmla="*/ 1213549 w 1218556"/>
+                <a:gd name="connsiteY32" fmla="*/ 910167 h 1388534"/>
+                <a:gd name="connsiteX33" fmla="*/ 1213549 w 1218556"/>
+                <a:gd name="connsiteY33" fmla="*/ 745067 h 1388534"/>
+                <a:gd name="connsiteX34" fmla="*/ 1200849 w 1218556"/>
+                <a:gd name="connsiteY34" fmla="*/ 715434 h 1388534"/>
+                <a:gd name="connsiteX35" fmla="*/ 1183916 w 1218556"/>
+                <a:gd name="connsiteY35" fmla="*/ 660400 h 1388534"/>
+                <a:gd name="connsiteX36" fmla="*/ 1158516 w 1218556"/>
+                <a:gd name="connsiteY36" fmla="*/ 601134 h 1388534"/>
+                <a:gd name="connsiteX37" fmla="*/ 1133116 w 1218556"/>
+                <a:gd name="connsiteY37" fmla="*/ 558800 h 1388534"/>
+                <a:gd name="connsiteX38" fmla="*/ 1103483 w 1218556"/>
+                <a:gd name="connsiteY38" fmla="*/ 478367 h 1388534"/>
+                <a:gd name="connsiteX39" fmla="*/ 1086549 w 1218556"/>
+                <a:gd name="connsiteY39" fmla="*/ 461434 h 1388534"/>
+              </a:gdLst>
+              <a:ahLst/>
+              <a:cxnLst>
+                <a:cxn ang="0">
+                  <a:pos x="connsiteX0" y="connsiteY0"/>
+                </a:cxn>
+                <a:cxn ang="0">
+                  <a:pos x="connsiteX1" y="connsiteY1"/>
+                </a:cxn>
+                <a:cxn ang="0">
+                  <a:pos x="connsiteX2" y="connsiteY2"/>
+                </a:cxn>
+                <a:cxn ang="0">
+                  <a:pos x="connsiteX3" y="connsiteY3"/>
+                </a:cxn>
+                <a:cxn ang="0">
+                  <a:pos x="connsiteX4" y="connsiteY4"/>
+                </a:cxn>
+                <a:cxn ang="0">
+                  <a:pos x="connsiteX5" y="connsiteY5"/>
+                </a:cxn>
+                <a:cxn ang="0">
+                  <a:pos x="connsiteX6" y="connsiteY6"/>
+                </a:cxn>
+                <a:cxn ang="0">
+                  <a:pos x="connsiteX7" y="connsiteY7"/>
+                </a:cxn>
+                <a:cxn ang="0">
+                  <a:pos x="connsiteX8" y="connsiteY8"/>
+                </a:cxn>
+                <a:cxn ang="0">
+                  <a:pos x="connsiteX9" y="connsiteY9"/>
+                </a:cxn>
+                <a:cxn ang="0">
+                  <a:pos x="connsiteX10" y="connsiteY10"/>
+                </a:cxn>
+                <a:cxn ang="0">
+                  <a:pos x="connsiteX11" y="connsiteY11"/>
+                </a:cxn>
+                <a:cxn ang="0">
+                  <a:pos x="connsiteX12" y="connsiteY12"/>
+                </a:cxn>
+                <a:cxn ang="0">
+                  <a:pos x="connsiteX13" y="connsiteY13"/>
+                </a:cxn>
+                <a:cxn ang="0">
+                  <a:pos x="connsiteX14" y="connsiteY14"/>
+                </a:cxn>
+                <a:cxn ang="0">
+                  <a:pos x="connsiteX15" y="connsiteY15"/>
+                </a:cxn>
+                <a:cxn ang="0">
+                  <a:pos x="connsiteX16" y="connsiteY16"/>
+                </a:cxn>
+                <a:cxn ang="0">
+                  <a:pos x="connsiteX17" y="connsiteY17"/>
+                </a:cxn>
+                <a:cxn ang="0">
+                  <a:pos x="connsiteX18" y="connsiteY18"/>
+                </a:cxn>
+                <a:cxn ang="0">
+                  <a:pos x="connsiteX19" y="connsiteY19"/>
+                </a:cxn>
+                <a:cxn ang="0">
+                  <a:pos x="connsiteX20" y="connsiteY20"/>
+                </a:cxn>
+                <a:cxn ang="0">
+                  <a:pos x="connsiteX21" y="connsiteY21"/>
+                </a:cxn>
+                <a:cxn ang="0">
+                  <a:pos x="connsiteX22" y="connsiteY22"/>
+                </a:cxn>
+                <a:cxn ang="0">
+                  <a:pos x="connsiteX23" y="connsiteY23"/>
+                </a:cxn>
+                <a:cxn ang="0">
+                  <a:pos x="connsiteX24" y="connsiteY24"/>
+                </a:cxn>
+                <a:cxn ang="0">
+                  <a:pos x="connsiteX25" y="connsiteY25"/>
+                </a:cxn>
+                <a:cxn ang="0">
+                  <a:pos x="connsiteX26" y="connsiteY26"/>
+                </a:cxn>
+                <a:cxn ang="0">
+                  <a:pos x="connsiteX27" y="connsiteY27"/>
+                </a:cxn>
+                <a:cxn ang="0">
+                  <a:pos x="connsiteX28" y="connsiteY28"/>
+                </a:cxn>
+                <a:cxn ang="0">
+                  <a:pos x="connsiteX29" y="connsiteY29"/>
+                </a:cxn>
+                <a:cxn ang="0">
+                  <a:pos x="connsiteX30" y="connsiteY30"/>
+                </a:cxn>
+                <a:cxn ang="0">
+                  <a:pos x="connsiteX31" y="connsiteY31"/>
+                </a:cxn>
+                <a:cxn ang="0">
+                  <a:pos x="connsiteX32" y="connsiteY32"/>
+                </a:cxn>
+                <a:cxn ang="0">
+                  <a:pos x="connsiteX33" y="connsiteY33"/>
+                </a:cxn>
+                <a:cxn ang="0">
+                  <a:pos x="connsiteX34" y="connsiteY34"/>
+                </a:cxn>
+                <a:cxn ang="0">
+                  <a:pos x="connsiteX35" y="connsiteY35"/>
+                </a:cxn>
+                <a:cxn ang="0">
+                  <a:pos x="connsiteX36" y="connsiteY36"/>
+                </a:cxn>
+                <a:cxn ang="0">
+                  <a:pos x="connsiteX37" y="connsiteY37"/>
+                </a:cxn>
+                <a:cxn ang="0">
+                  <a:pos x="connsiteX38" y="connsiteY38"/>
+                </a:cxn>
+                <a:cxn ang="0">
+                  <a:pos x="connsiteX39" y="connsiteY39"/>
+                </a:cxn>
+              </a:cxnLst>
+              <a:rect l="l" t="t" r="r" b="b"/>
+              <a:pathLst>
+                <a:path w="1218556" h="1388534">
+                  <a:moveTo>
+                    <a:pt x="1086549" y="461434"/>
+                  </a:moveTo>
+                  <a:cubicBezTo>
+                    <a:pt x="1076671" y="436034"/>
+                    <a:pt x="1096400" y="432422"/>
+                    <a:pt x="1044216" y="325967"/>
+                  </a:cubicBezTo>
+                  <a:cubicBezTo>
+                    <a:pt x="1026958" y="290762"/>
+                    <a:pt x="1005552" y="257725"/>
+                    <a:pt x="984949" y="224367"/>
+                  </a:cubicBezTo>
+                  <a:cubicBezTo>
+                    <a:pt x="975898" y="209712"/>
+                    <a:pt x="968548" y="193061"/>
+                    <a:pt x="955316" y="182034"/>
+                  </a:cubicBezTo>
+                  <a:cubicBezTo>
+                    <a:pt x="892404" y="129607"/>
+                    <a:pt x="833965" y="93311"/>
+                    <a:pt x="760583" y="63500"/>
+                  </a:cubicBezTo>
+                  <a:cubicBezTo>
+                    <a:pt x="708925" y="42514"/>
+                    <a:pt x="658846" y="32657"/>
+                    <a:pt x="603949" y="21167"/>
+                  </a:cubicBezTo>
+                  <a:cubicBezTo>
+                    <a:pt x="514142" y="2370"/>
+                    <a:pt x="536219" y="5998"/>
+                    <a:pt x="464249" y="0"/>
+                  </a:cubicBezTo>
+                  <a:cubicBezTo>
+                    <a:pt x="441671" y="2822"/>
+                    <a:pt x="418744" y="3605"/>
+                    <a:pt x="396516" y="8467"/>
+                  </a:cubicBezTo>
+                  <a:cubicBezTo>
+                    <a:pt x="373408" y="13522"/>
+                    <a:pt x="351499" y="23039"/>
+                    <a:pt x="328783" y="29634"/>
+                  </a:cubicBezTo>
+                  <a:cubicBezTo>
+                    <a:pt x="307745" y="35742"/>
+                    <a:pt x="286450" y="40923"/>
+                    <a:pt x="265283" y="46567"/>
+                  </a:cubicBezTo>
+                  <a:cubicBezTo>
+                    <a:pt x="249761" y="55034"/>
+                    <a:pt x="233355" y="62051"/>
+                    <a:pt x="218716" y="71967"/>
+                  </a:cubicBezTo>
+                  <a:cubicBezTo>
+                    <a:pt x="158556" y="112721"/>
+                    <a:pt x="111955" y="147050"/>
+                    <a:pt x="70549" y="207434"/>
+                  </a:cubicBezTo>
+                  <a:cubicBezTo>
+                    <a:pt x="35014" y="259256"/>
+                    <a:pt x="28357" y="297548"/>
+                    <a:pt x="11283" y="355600"/>
+                  </a:cubicBezTo>
+                  <a:cubicBezTo>
+                    <a:pt x="-2712" y="467560"/>
+                    <a:pt x="-4775" y="453250"/>
+                    <a:pt x="11283" y="613834"/>
+                  </a:cubicBezTo>
+                  <a:cubicBezTo>
+                    <a:pt x="13463" y="635632"/>
+                    <a:pt x="21434" y="656504"/>
+                    <a:pt x="28216" y="677334"/>
+                  </a:cubicBezTo>
+                  <a:cubicBezTo>
+                    <a:pt x="41205" y="717228"/>
+                    <a:pt x="52967" y="757773"/>
+                    <a:pt x="70549" y="795867"/>
+                  </a:cubicBezTo>
+                  <a:cubicBezTo>
+                    <a:pt x="79016" y="814211"/>
+                    <a:pt x="89363" y="831800"/>
+                    <a:pt x="95949" y="850900"/>
+                  </a:cubicBezTo>
+                  <a:cubicBezTo>
+                    <a:pt x="103536" y="872902"/>
+                    <a:pt x="105985" y="896407"/>
+                    <a:pt x="112883" y="918634"/>
+                  </a:cubicBezTo>
+                  <a:cubicBezTo>
+                    <a:pt x="119368" y="939531"/>
+                    <a:pt x="139975" y="989018"/>
+                    <a:pt x="150983" y="1011767"/>
+                  </a:cubicBezTo>
+                  <a:cubicBezTo>
+                    <a:pt x="166101" y="1043010"/>
+                    <a:pt x="176724" y="1077133"/>
+                    <a:pt x="197549" y="1104900"/>
+                  </a:cubicBezTo>
+                  <a:cubicBezTo>
+                    <a:pt x="206016" y="1116189"/>
+                    <a:pt x="215259" y="1126936"/>
+                    <a:pt x="222949" y="1138767"/>
+                  </a:cubicBezTo>
+                  <a:cubicBezTo>
+                    <a:pt x="255391" y="1188677"/>
+                    <a:pt x="251083" y="1198680"/>
+                    <a:pt x="294916" y="1244600"/>
+                  </a:cubicBezTo>
+                  <a:cubicBezTo>
+                    <a:pt x="308764" y="1259107"/>
+                    <a:pt x="326611" y="1269244"/>
+                    <a:pt x="341483" y="1282700"/>
+                  </a:cubicBezTo>
+                  <a:cubicBezTo>
+                    <a:pt x="356281" y="1296089"/>
+                    <a:pt x="368305" y="1312478"/>
+                    <a:pt x="383816" y="1325034"/>
+                  </a:cubicBezTo>
+                  <a:cubicBezTo>
+                    <a:pt x="397300" y="1335950"/>
+                    <a:pt x="453708" y="1369752"/>
+                    <a:pt x="472716" y="1375834"/>
+                  </a:cubicBezTo>
+                  <a:cubicBezTo>
+                    <a:pt x="493275" y="1382413"/>
+                    <a:pt x="515049" y="1384301"/>
+                    <a:pt x="536216" y="1388534"/>
+                  </a:cubicBezTo>
+                  <a:cubicBezTo>
+                    <a:pt x="588427" y="1387123"/>
+                    <a:pt x="640717" y="1387492"/>
+                    <a:pt x="692849" y="1384300"/>
+                  </a:cubicBezTo>
+                  <a:cubicBezTo>
+                    <a:pt x="722617" y="1382477"/>
+                    <a:pt x="811262" y="1360636"/>
+                    <a:pt x="828316" y="1354667"/>
+                  </a:cubicBezTo>
+                  <a:cubicBezTo>
+                    <a:pt x="899127" y="1329883"/>
+                    <a:pt x="920079" y="1314439"/>
+                    <a:pt x="976483" y="1270000"/>
+                  </a:cubicBezTo>
+                  <a:cubicBezTo>
+                    <a:pt x="1048551" y="1213219"/>
+                    <a:pt x="1061798" y="1201944"/>
+                    <a:pt x="1120416" y="1130300"/>
+                  </a:cubicBezTo>
+                  <a:cubicBezTo>
+                    <a:pt x="1137037" y="1109985"/>
+                    <a:pt x="1151930" y="1088303"/>
+                    <a:pt x="1166983" y="1066800"/>
+                  </a:cubicBezTo>
+                  <a:cubicBezTo>
+                    <a:pt x="1171701" y="1060059"/>
+                    <a:pt x="1176235" y="1053105"/>
+                    <a:pt x="1179683" y="1045634"/>
+                  </a:cubicBezTo>
+                  <a:cubicBezTo>
+                    <a:pt x="1199371" y="1002976"/>
+                    <a:pt x="1205912" y="955995"/>
+                    <a:pt x="1213549" y="910167"/>
+                  </a:cubicBezTo>
+                  <a:cubicBezTo>
+                    <a:pt x="1217751" y="847151"/>
+                    <a:pt x="1222321" y="813048"/>
+                    <a:pt x="1213549" y="745067"/>
+                  </a:cubicBezTo>
+                  <a:cubicBezTo>
+                    <a:pt x="1212174" y="734409"/>
+                    <a:pt x="1204707" y="725464"/>
+                    <a:pt x="1200849" y="715434"/>
+                  </a:cubicBezTo>
+                  <a:cubicBezTo>
+                    <a:pt x="1188998" y="684619"/>
+                    <a:pt x="1194993" y="693629"/>
+                    <a:pt x="1183916" y="660400"/>
+                  </a:cubicBezTo>
+                  <a:cubicBezTo>
+                    <a:pt x="1176452" y="638009"/>
+                    <a:pt x="1169887" y="621349"/>
+                    <a:pt x="1158516" y="601134"/>
+                  </a:cubicBezTo>
+                  <a:cubicBezTo>
+                    <a:pt x="1150448" y="586791"/>
+                    <a:pt x="1133116" y="558800"/>
+                    <a:pt x="1133116" y="558800"/>
+                  </a:cubicBezTo>
+                  <a:cubicBezTo>
+                    <a:pt x="1125718" y="521809"/>
+                    <a:pt x="1128580" y="528561"/>
+                    <a:pt x="1103483" y="478367"/>
+                  </a:cubicBezTo>
+                  <a:cubicBezTo>
+                    <a:pt x="1089372" y="450145"/>
+                    <a:pt x="1096427" y="486834"/>
+                    <a:pt x="1086549" y="461434"/>
+                  </a:cubicBezTo>
+                  <a:close/>
+                </a:path>
+              </a:pathLst>
+            </a:custGeom>
+            <a:noFill/>
+            <a:ln w="38100">
+              <a:solidFill>
+                <a:srgbClr val="FFFF00"/>
+              </a:solidFill>
+            </a:ln>
+          </p:spPr>
+          <p:style>
+            <a:lnRef idx="2">
+              <a:schemeClr val="accent1">
+                <a:shade val="50000"/>
+              </a:schemeClr>
+            </a:lnRef>
+            <a:fillRef idx="1">
+              <a:schemeClr val="accent1"/>
+            </a:fillRef>
+            <a:effectRef idx="0">
+              <a:schemeClr val="accent1"/>
+            </a:effectRef>
+            <a:fontRef idx="minor">
+              <a:schemeClr val="lt1"/>
+            </a:fontRef>
+          </p:style>
+          <p:txBody>
+            <a:bodyPr rtlCol="0" anchor="ctr"/>
+            <a:lstStyle/>
+            <a:p>
+              <a:pPr algn="ctr"/>
+              <a:endParaRPr lang="en-DE"/>
+            </a:p>
+          </p:txBody>
+        </p:sp>
+        <p:sp>
+          <p:nvSpPr>
+            <p:cNvPr id="18" name="Freeform: Shape 17">
+              <a:extLst>
+                <a:ext uri="{FF2B5EF4-FFF2-40B4-BE49-F238E27FC236}">
+                  <a16:creationId xmlns:a16="http://schemas.microsoft.com/office/drawing/2014/main" id="{E8231067-9B4E-4E12-9949-39330A4E45B5}"/>
+                </a:ext>
+              </a:extLst>
+            </p:cNvPr>
+            <p:cNvSpPr/>
+            <p:nvPr/>
+          </p:nvSpPr>
+          <p:spPr>
+            <a:xfrm>
+              <a:off x="4906433" y="2802466"/>
+              <a:ext cx="770467" cy="1308100"/>
+            </a:xfrm>
+            <a:custGeom>
+              <a:avLst/>
+              <a:gdLst>
+                <a:gd name="connsiteX0" fmla="*/ 1086549 w 1218556"/>
+                <a:gd name="connsiteY0" fmla="*/ 461434 h 1388534"/>
+                <a:gd name="connsiteX1" fmla="*/ 1044216 w 1218556"/>
+                <a:gd name="connsiteY1" fmla="*/ 325967 h 1388534"/>
+                <a:gd name="connsiteX2" fmla="*/ 984949 w 1218556"/>
+                <a:gd name="connsiteY2" fmla="*/ 224367 h 1388534"/>
+                <a:gd name="connsiteX3" fmla="*/ 955316 w 1218556"/>
+                <a:gd name="connsiteY3" fmla="*/ 182034 h 1388534"/>
+                <a:gd name="connsiteX4" fmla="*/ 760583 w 1218556"/>
+                <a:gd name="connsiteY4" fmla="*/ 63500 h 1388534"/>
+                <a:gd name="connsiteX5" fmla="*/ 603949 w 1218556"/>
+                <a:gd name="connsiteY5" fmla="*/ 21167 h 1388534"/>
+                <a:gd name="connsiteX6" fmla="*/ 464249 w 1218556"/>
+                <a:gd name="connsiteY6" fmla="*/ 0 h 1388534"/>
+                <a:gd name="connsiteX7" fmla="*/ 396516 w 1218556"/>
+                <a:gd name="connsiteY7" fmla="*/ 8467 h 1388534"/>
+                <a:gd name="connsiteX8" fmla="*/ 328783 w 1218556"/>
+                <a:gd name="connsiteY8" fmla="*/ 29634 h 1388534"/>
+                <a:gd name="connsiteX9" fmla="*/ 265283 w 1218556"/>
+                <a:gd name="connsiteY9" fmla="*/ 46567 h 1388534"/>
+                <a:gd name="connsiteX10" fmla="*/ 218716 w 1218556"/>
+                <a:gd name="connsiteY10" fmla="*/ 71967 h 1388534"/>
+                <a:gd name="connsiteX11" fmla="*/ 70549 w 1218556"/>
+                <a:gd name="connsiteY11" fmla="*/ 207434 h 1388534"/>
+                <a:gd name="connsiteX12" fmla="*/ 11283 w 1218556"/>
+                <a:gd name="connsiteY12" fmla="*/ 355600 h 1388534"/>
+                <a:gd name="connsiteX13" fmla="*/ 11283 w 1218556"/>
+                <a:gd name="connsiteY13" fmla="*/ 613834 h 1388534"/>
+                <a:gd name="connsiteX14" fmla="*/ 28216 w 1218556"/>
+                <a:gd name="connsiteY14" fmla="*/ 677334 h 1388534"/>
+                <a:gd name="connsiteX15" fmla="*/ 70549 w 1218556"/>
+                <a:gd name="connsiteY15" fmla="*/ 795867 h 1388534"/>
+                <a:gd name="connsiteX16" fmla="*/ 95949 w 1218556"/>
+                <a:gd name="connsiteY16" fmla="*/ 850900 h 1388534"/>
+                <a:gd name="connsiteX17" fmla="*/ 112883 w 1218556"/>
+                <a:gd name="connsiteY17" fmla="*/ 918634 h 1388534"/>
+                <a:gd name="connsiteX18" fmla="*/ 150983 w 1218556"/>
+                <a:gd name="connsiteY18" fmla="*/ 1011767 h 1388534"/>
+                <a:gd name="connsiteX19" fmla="*/ 197549 w 1218556"/>
+                <a:gd name="connsiteY19" fmla="*/ 1104900 h 1388534"/>
+                <a:gd name="connsiteX20" fmla="*/ 222949 w 1218556"/>
+                <a:gd name="connsiteY20" fmla="*/ 1138767 h 1388534"/>
+                <a:gd name="connsiteX21" fmla="*/ 294916 w 1218556"/>
+                <a:gd name="connsiteY21" fmla="*/ 1244600 h 1388534"/>
+                <a:gd name="connsiteX22" fmla="*/ 341483 w 1218556"/>
+                <a:gd name="connsiteY22" fmla="*/ 1282700 h 1388534"/>
+                <a:gd name="connsiteX23" fmla="*/ 383816 w 1218556"/>
+                <a:gd name="connsiteY23" fmla="*/ 1325034 h 1388534"/>
+                <a:gd name="connsiteX24" fmla="*/ 472716 w 1218556"/>
+                <a:gd name="connsiteY24" fmla="*/ 1375834 h 1388534"/>
+                <a:gd name="connsiteX25" fmla="*/ 536216 w 1218556"/>
+                <a:gd name="connsiteY25" fmla="*/ 1388534 h 1388534"/>
+                <a:gd name="connsiteX26" fmla="*/ 692849 w 1218556"/>
+                <a:gd name="connsiteY26" fmla="*/ 1384300 h 1388534"/>
+                <a:gd name="connsiteX27" fmla="*/ 828316 w 1218556"/>
+                <a:gd name="connsiteY27" fmla="*/ 1354667 h 1388534"/>
+                <a:gd name="connsiteX28" fmla="*/ 976483 w 1218556"/>
+                <a:gd name="connsiteY28" fmla="*/ 1270000 h 1388534"/>
+                <a:gd name="connsiteX29" fmla="*/ 1120416 w 1218556"/>
+                <a:gd name="connsiteY29" fmla="*/ 1130300 h 1388534"/>
+                <a:gd name="connsiteX30" fmla="*/ 1166983 w 1218556"/>
+                <a:gd name="connsiteY30" fmla="*/ 1066800 h 1388534"/>
+                <a:gd name="connsiteX31" fmla="*/ 1179683 w 1218556"/>
+                <a:gd name="connsiteY31" fmla="*/ 1045634 h 1388534"/>
+                <a:gd name="connsiteX32" fmla="*/ 1213549 w 1218556"/>
+                <a:gd name="connsiteY32" fmla="*/ 910167 h 1388534"/>
+                <a:gd name="connsiteX33" fmla="*/ 1213549 w 1218556"/>
+                <a:gd name="connsiteY33" fmla="*/ 745067 h 1388534"/>
+                <a:gd name="connsiteX34" fmla="*/ 1200849 w 1218556"/>
+                <a:gd name="connsiteY34" fmla="*/ 715434 h 1388534"/>
+                <a:gd name="connsiteX35" fmla="*/ 1183916 w 1218556"/>
+                <a:gd name="connsiteY35" fmla="*/ 660400 h 1388534"/>
+                <a:gd name="connsiteX36" fmla="*/ 1158516 w 1218556"/>
+                <a:gd name="connsiteY36" fmla="*/ 601134 h 1388534"/>
+                <a:gd name="connsiteX37" fmla="*/ 1133116 w 1218556"/>
+                <a:gd name="connsiteY37" fmla="*/ 558800 h 1388534"/>
+                <a:gd name="connsiteX38" fmla="*/ 1103483 w 1218556"/>
+                <a:gd name="connsiteY38" fmla="*/ 478367 h 1388534"/>
+                <a:gd name="connsiteX39" fmla="*/ 1086549 w 1218556"/>
+                <a:gd name="connsiteY39" fmla="*/ 461434 h 1388534"/>
+              </a:gdLst>
+              <a:ahLst/>
+              <a:cxnLst>
+                <a:cxn ang="0">
+                  <a:pos x="connsiteX0" y="connsiteY0"/>
+                </a:cxn>
+                <a:cxn ang="0">
+                  <a:pos x="connsiteX1" y="connsiteY1"/>
+                </a:cxn>
+                <a:cxn ang="0">
+                  <a:pos x="connsiteX2" y="connsiteY2"/>
+                </a:cxn>
+                <a:cxn ang="0">
+                  <a:pos x="connsiteX3" y="connsiteY3"/>
+                </a:cxn>
+                <a:cxn ang="0">
+                  <a:pos x="connsiteX4" y="connsiteY4"/>
+                </a:cxn>
+                <a:cxn ang="0">
+                  <a:pos x="connsiteX5" y="connsiteY5"/>
+                </a:cxn>
+                <a:cxn ang="0">
+                  <a:pos x="connsiteX6" y="connsiteY6"/>
+                </a:cxn>
+                <a:cxn ang="0">
+                  <a:pos x="connsiteX7" y="connsiteY7"/>
+                </a:cxn>
+                <a:cxn ang="0">
+                  <a:pos x="connsiteX8" y="connsiteY8"/>
+                </a:cxn>
+                <a:cxn ang="0">
+                  <a:pos x="connsiteX9" y="connsiteY9"/>
+                </a:cxn>
+                <a:cxn ang="0">
+                  <a:pos x="connsiteX10" y="connsiteY10"/>
+                </a:cxn>
+                <a:cxn ang="0">
+                  <a:pos x="connsiteX11" y="connsiteY11"/>
+                </a:cxn>
+                <a:cxn ang="0">
+                  <a:pos x="connsiteX12" y="connsiteY12"/>
+                </a:cxn>
+                <a:cxn ang="0">
+                  <a:pos x="connsiteX13" y="connsiteY13"/>
+                </a:cxn>
+                <a:cxn ang="0">
+                  <a:pos x="connsiteX14" y="connsiteY14"/>
+                </a:cxn>
+                <a:cxn ang="0">
+                  <a:pos x="connsiteX15" y="connsiteY15"/>
+                </a:cxn>
+                <a:cxn ang="0">
+                  <a:pos x="connsiteX16" y="connsiteY16"/>
+                </a:cxn>
+                <a:cxn ang="0">
+                  <a:pos x="connsiteX17" y="connsiteY17"/>
+                </a:cxn>
+                <a:cxn ang="0">
+                  <a:pos x="connsiteX18" y="connsiteY18"/>
+                </a:cxn>
+                <a:cxn ang="0">
+                  <a:pos x="connsiteX19" y="connsiteY19"/>
+                </a:cxn>
+                <a:cxn ang="0">
+                  <a:pos x="connsiteX20" y="connsiteY20"/>
+                </a:cxn>
+                <a:cxn ang="0">
+                  <a:pos x="connsiteX21" y="connsiteY21"/>
+                </a:cxn>
+                <a:cxn ang="0">
+                  <a:pos x="connsiteX22" y="connsiteY22"/>
+                </a:cxn>
+                <a:cxn ang="0">
+                  <a:pos x="connsiteX23" y="connsiteY23"/>
+                </a:cxn>
+                <a:cxn ang="0">
+                  <a:pos x="connsiteX24" y="connsiteY24"/>
+                </a:cxn>
+                <a:cxn ang="0">
+                  <a:pos x="connsiteX25" y="connsiteY25"/>
+                </a:cxn>
+                <a:cxn ang="0">
+                  <a:pos x="connsiteX26" y="connsiteY26"/>
+                </a:cxn>
+                <a:cxn ang="0">
+                  <a:pos x="connsiteX27" y="connsiteY27"/>
+                </a:cxn>
+                <a:cxn ang="0">
+                  <a:pos x="connsiteX28" y="connsiteY28"/>
+                </a:cxn>
+                <a:cxn ang="0">
+                  <a:pos x="connsiteX29" y="connsiteY29"/>
+                </a:cxn>
+                <a:cxn ang="0">
+                  <a:pos x="connsiteX30" y="connsiteY30"/>
+                </a:cxn>
+                <a:cxn ang="0">
+                  <a:pos x="connsiteX31" y="connsiteY31"/>
+                </a:cxn>
+                <a:cxn ang="0">
+                  <a:pos x="connsiteX32" y="connsiteY32"/>
+                </a:cxn>
+                <a:cxn ang="0">
+                  <a:pos x="connsiteX33" y="connsiteY33"/>
+                </a:cxn>
+                <a:cxn ang="0">
+                  <a:pos x="connsiteX34" y="connsiteY34"/>
+                </a:cxn>
+                <a:cxn ang="0">
+                  <a:pos x="connsiteX35" y="connsiteY35"/>
+                </a:cxn>
+                <a:cxn ang="0">
+                  <a:pos x="connsiteX36" y="connsiteY36"/>
+                </a:cxn>
+                <a:cxn ang="0">
+                  <a:pos x="connsiteX37" y="connsiteY37"/>
+                </a:cxn>
+                <a:cxn ang="0">
+                  <a:pos x="connsiteX38" y="connsiteY38"/>
+                </a:cxn>
+                <a:cxn ang="0">
+                  <a:pos x="connsiteX39" y="connsiteY39"/>
+                </a:cxn>
+              </a:cxnLst>
+              <a:rect l="l" t="t" r="r" b="b"/>
+              <a:pathLst>
+                <a:path w="1218556" h="1388534">
+                  <a:moveTo>
+                    <a:pt x="1086549" y="461434"/>
+                  </a:moveTo>
+                  <a:cubicBezTo>
+                    <a:pt x="1076671" y="436034"/>
+                    <a:pt x="1096400" y="432422"/>
+                    <a:pt x="1044216" y="325967"/>
+                  </a:cubicBezTo>
+                  <a:cubicBezTo>
+                    <a:pt x="1026958" y="290762"/>
+                    <a:pt x="1005552" y="257725"/>
+                    <a:pt x="984949" y="224367"/>
+                  </a:cubicBezTo>
+                  <a:cubicBezTo>
+                    <a:pt x="975898" y="209712"/>
+                    <a:pt x="968548" y="193061"/>
+                    <a:pt x="955316" y="182034"/>
+                  </a:cubicBezTo>
+                  <a:cubicBezTo>
+                    <a:pt x="892404" y="129607"/>
+                    <a:pt x="833965" y="93311"/>
+                    <a:pt x="760583" y="63500"/>
+                  </a:cubicBezTo>
+                  <a:cubicBezTo>
+                    <a:pt x="708925" y="42514"/>
+                    <a:pt x="658846" y="32657"/>
+                    <a:pt x="603949" y="21167"/>
+                  </a:cubicBezTo>
+                  <a:cubicBezTo>
+                    <a:pt x="514142" y="2370"/>
+                    <a:pt x="536219" y="5998"/>
+                    <a:pt x="464249" y="0"/>
+                  </a:cubicBezTo>
+                  <a:cubicBezTo>
+                    <a:pt x="441671" y="2822"/>
+                    <a:pt x="418744" y="3605"/>
+                    <a:pt x="396516" y="8467"/>
+                  </a:cubicBezTo>
+                  <a:cubicBezTo>
+                    <a:pt x="373408" y="13522"/>
+                    <a:pt x="351499" y="23039"/>
+                    <a:pt x="328783" y="29634"/>
+                  </a:cubicBezTo>
+                  <a:cubicBezTo>
+                    <a:pt x="307745" y="35742"/>
+                    <a:pt x="286450" y="40923"/>
+                    <a:pt x="265283" y="46567"/>
+                  </a:cubicBezTo>
+                  <a:cubicBezTo>
+                    <a:pt x="249761" y="55034"/>
+                    <a:pt x="233355" y="62051"/>
+                    <a:pt x="218716" y="71967"/>
+                  </a:cubicBezTo>
+                  <a:cubicBezTo>
+                    <a:pt x="158556" y="112721"/>
+                    <a:pt x="111955" y="147050"/>
+                    <a:pt x="70549" y="207434"/>
+                  </a:cubicBezTo>
+                  <a:cubicBezTo>
+                    <a:pt x="35014" y="259256"/>
+                    <a:pt x="28357" y="297548"/>
+                    <a:pt x="11283" y="355600"/>
+                  </a:cubicBezTo>
+                  <a:cubicBezTo>
+                    <a:pt x="-2712" y="467560"/>
+                    <a:pt x="-4775" y="453250"/>
+                    <a:pt x="11283" y="613834"/>
+                  </a:cubicBezTo>
+                  <a:cubicBezTo>
+                    <a:pt x="13463" y="635632"/>
+                    <a:pt x="21434" y="656504"/>
+                    <a:pt x="28216" y="677334"/>
+                  </a:cubicBezTo>
+                  <a:cubicBezTo>
+                    <a:pt x="41205" y="717228"/>
+                    <a:pt x="52967" y="757773"/>
+                    <a:pt x="70549" y="795867"/>
+                  </a:cubicBezTo>
+                  <a:cubicBezTo>
+                    <a:pt x="79016" y="814211"/>
+                    <a:pt x="89363" y="831800"/>
+                    <a:pt x="95949" y="850900"/>
+                  </a:cubicBezTo>
+                  <a:cubicBezTo>
+                    <a:pt x="103536" y="872902"/>
+                    <a:pt x="105985" y="896407"/>
+                    <a:pt x="112883" y="918634"/>
+                  </a:cubicBezTo>
+                  <a:cubicBezTo>
+                    <a:pt x="119368" y="939531"/>
+                    <a:pt x="139975" y="989018"/>
+                    <a:pt x="150983" y="1011767"/>
+                  </a:cubicBezTo>
+                  <a:cubicBezTo>
+                    <a:pt x="166101" y="1043010"/>
+                    <a:pt x="176724" y="1077133"/>
+                    <a:pt x="197549" y="1104900"/>
+                  </a:cubicBezTo>
+                  <a:cubicBezTo>
+                    <a:pt x="206016" y="1116189"/>
+                    <a:pt x="215259" y="1126936"/>
+                    <a:pt x="222949" y="1138767"/>
+                  </a:cubicBezTo>
+                  <a:cubicBezTo>
+                    <a:pt x="255391" y="1188677"/>
+                    <a:pt x="251083" y="1198680"/>
+                    <a:pt x="294916" y="1244600"/>
+                  </a:cubicBezTo>
+                  <a:cubicBezTo>
+                    <a:pt x="308764" y="1259107"/>
+                    <a:pt x="326611" y="1269244"/>
+                    <a:pt x="341483" y="1282700"/>
+                  </a:cubicBezTo>
+                  <a:cubicBezTo>
+                    <a:pt x="356281" y="1296089"/>
+                    <a:pt x="368305" y="1312478"/>
+                    <a:pt x="383816" y="1325034"/>
+                  </a:cubicBezTo>
+                  <a:cubicBezTo>
+                    <a:pt x="397300" y="1335950"/>
+                    <a:pt x="453708" y="1369752"/>
+                    <a:pt x="472716" y="1375834"/>
+                  </a:cubicBezTo>
+                  <a:cubicBezTo>
+                    <a:pt x="493275" y="1382413"/>
+                    <a:pt x="515049" y="1384301"/>
+                    <a:pt x="536216" y="1388534"/>
+                  </a:cubicBezTo>
+                  <a:cubicBezTo>
+                    <a:pt x="588427" y="1387123"/>
+                    <a:pt x="640717" y="1387492"/>
+                    <a:pt x="692849" y="1384300"/>
+                  </a:cubicBezTo>
+                  <a:cubicBezTo>
+                    <a:pt x="722617" y="1382477"/>
+                    <a:pt x="811262" y="1360636"/>
+                    <a:pt x="828316" y="1354667"/>
+                  </a:cubicBezTo>
+                  <a:cubicBezTo>
+                    <a:pt x="899127" y="1329883"/>
+                    <a:pt x="920079" y="1314439"/>
+                    <a:pt x="976483" y="1270000"/>
+                  </a:cubicBezTo>
+                  <a:cubicBezTo>
+                    <a:pt x="1048551" y="1213219"/>
+                    <a:pt x="1061798" y="1201944"/>
+                    <a:pt x="1120416" y="1130300"/>
+                  </a:cubicBezTo>
+                  <a:cubicBezTo>
+                    <a:pt x="1137037" y="1109985"/>
+                    <a:pt x="1151930" y="1088303"/>
+                    <a:pt x="1166983" y="1066800"/>
+                  </a:cubicBezTo>
+                  <a:cubicBezTo>
+                    <a:pt x="1171701" y="1060059"/>
+                    <a:pt x="1176235" y="1053105"/>
+                    <a:pt x="1179683" y="1045634"/>
+                  </a:cubicBezTo>
+                  <a:cubicBezTo>
+                    <a:pt x="1199371" y="1002976"/>
+                    <a:pt x="1205912" y="955995"/>
+                    <a:pt x="1213549" y="910167"/>
+                  </a:cubicBezTo>
+                  <a:cubicBezTo>
+                    <a:pt x="1217751" y="847151"/>
+                    <a:pt x="1222321" y="813048"/>
+                    <a:pt x="1213549" y="745067"/>
+                  </a:cubicBezTo>
+                  <a:cubicBezTo>
+                    <a:pt x="1212174" y="734409"/>
+                    <a:pt x="1204707" y="725464"/>
+                    <a:pt x="1200849" y="715434"/>
+                  </a:cubicBezTo>
+                  <a:cubicBezTo>
+                    <a:pt x="1188998" y="684619"/>
+                    <a:pt x="1194993" y="693629"/>
+                    <a:pt x="1183916" y="660400"/>
+                  </a:cubicBezTo>
+                  <a:cubicBezTo>
+                    <a:pt x="1176452" y="638009"/>
+                    <a:pt x="1169887" y="621349"/>
+                    <a:pt x="1158516" y="601134"/>
+                  </a:cubicBezTo>
+                  <a:cubicBezTo>
+                    <a:pt x="1150448" y="586791"/>
+                    <a:pt x="1133116" y="558800"/>
+                    <a:pt x="1133116" y="558800"/>
+                  </a:cubicBezTo>
+                  <a:cubicBezTo>
+                    <a:pt x="1125718" y="521809"/>
+                    <a:pt x="1128580" y="528561"/>
+                    <a:pt x="1103483" y="478367"/>
+                  </a:cubicBezTo>
+                  <a:cubicBezTo>
+                    <a:pt x="1089372" y="450145"/>
+                    <a:pt x="1096427" y="486834"/>
+                    <a:pt x="1086549" y="461434"/>
+                  </a:cubicBezTo>
+                  <a:close/>
+                </a:path>
+              </a:pathLst>
+            </a:custGeom>
+            <a:noFill/>
+            <a:ln w="38100">
+              <a:solidFill>
+                <a:srgbClr val="FFFF00"/>
+              </a:solidFill>
+            </a:ln>
+          </p:spPr>
+          <p:style>
+            <a:lnRef idx="2">
+              <a:schemeClr val="accent1">
+                <a:shade val="50000"/>
+              </a:schemeClr>
+            </a:lnRef>
+            <a:fillRef idx="1">
+              <a:schemeClr val="accent1"/>
+            </a:fillRef>
+            <a:effectRef idx="0">
+              <a:schemeClr val="accent1"/>
+            </a:effectRef>
+            <a:fontRef idx="minor">
+              <a:schemeClr val="lt1"/>
+            </a:fontRef>
+          </p:style>
+          <p:txBody>
+            <a:bodyPr rtlCol="0" anchor="ctr"/>
+            <a:lstStyle/>
+            <a:p>
+              <a:pPr algn="ctr"/>
+              <a:endParaRPr lang="en-DE"/>
+            </a:p>
+          </p:txBody>
+        </p:sp>
+        <p:sp>
+          <p:nvSpPr>
+            <p:cNvPr id="19" name="Freeform: Shape 18">
+              <a:extLst>
+                <a:ext uri="{FF2B5EF4-FFF2-40B4-BE49-F238E27FC236}">
+                  <a16:creationId xmlns:a16="http://schemas.microsoft.com/office/drawing/2014/main" id="{C21173E6-988C-493F-8B9D-9F2812E72F32}"/>
+                </a:ext>
+              </a:extLst>
+            </p:cNvPr>
+            <p:cNvSpPr/>
+            <p:nvPr/>
+          </p:nvSpPr>
+          <p:spPr>
+            <a:xfrm>
+              <a:off x="1938867" y="4258732"/>
+              <a:ext cx="694267" cy="1083735"/>
+            </a:xfrm>
+            <a:custGeom>
+              <a:avLst/>
+              <a:gdLst>
+                <a:gd name="connsiteX0" fmla="*/ 1086549 w 1218556"/>
+                <a:gd name="connsiteY0" fmla="*/ 461434 h 1388534"/>
+                <a:gd name="connsiteX1" fmla="*/ 1044216 w 1218556"/>
+                <a:gd name="connsiteY1" fmla="*/ 325967 h 1388534"/>
+                <a:gd name="connsiteX2" fmla="*/ 984949 w 1218556"/>
+                <a:gd name="connsiteY2" fmla="*/ 224367 h 1388534"/>
+                <a:gd name="connsiteX3" fmla="*/ 955316 w 1218556"/>
+                <a:gd name="connsiteY3" fmla="*/ 182034 h 1388534"/>
+                <a:gd name="connsiteX4" fmla="*/ 760583 w 1218556"/>
+                <a:gd name="connsiteY4" fmla="*/ 63500 h 1388534"/>
+                <a:gd name="connsiteX5" fmla="*/ 603949 w 1218556"/>
+                <a:gd name="connsiteY5" fmla="*/ 21167 h 1388534"/>
+                <a:gd name="connsiteX6" fmla="*/ 464249 w 1218556"/>
+                <a:gd name="connsiteY6" fmla="*/ 0 h 1388534"/>
+                <a:gd name="connsiteX7" fmla="*/ 396516 w 1218556"/>
+                <a:gd name="connsiteY7" fmla="*/ 8467 h 1388534"/>
+                <a:gd name="connsiteX8" fmla="*/ 328783 w 1218556"/>
+                <a:gd name="connsiteY8" fmla="*/ 29634 h 1388534"/>
+                <a:gd name="connsiteX9" fmla="*/ 265283 w 1218556"/>
+                <a:gd name="connsiteY9" fmla="*/ 46567 h 1388534"/>
+                <a:gd name="connsiteX10" fmla="*/ 218716 w 1218556"/>
+                <a:gd name="connsiteY10" fmla="*/ 71967 h 1388534"/>
+                <a:gd name="connsiteX11" fmla="*/ 70549 w 1218556"/>
+                <a:gd name="connsiteY11" fmla="*/ 207434 h 1388534"/>
+                <a:gd name="connsiteX12" fmla="*/ 11283 w 1218556"/>
+                <a:gd name="connsiteY12" fmla="*/ 355600 h 1388534"/>
+                <a:gd name="connsiteX13" fmla="*/ 11283 w 1218556"/>
+                <a:gd name="connsiteY13" fmla="*/ 613834 h 1388534"/>
+                <a:gd name="connsiteX14" fmla="*/ 28216 w 1218556"/>
+                <a:gd name="connsiteY14" fmla="*/ 677334 h 1388534"/>
+                <a:gd name="connsiteX15" fmla="*/ 70549 w 1218556"/>
+                <a:gd name="connsiteY15" fmla="*/ 795867 h 1388534"/>
+                <a:gd name="connsiteX16" fmla="*/ 95949 w 1218556"/>
+                <a:gd name="connsiteY16" fmla="*/ 850900 h 1388534"/>
+                <a:gd name="connsiteX17" fmla="*/ 112883 w 1218556"/>
+                <a:gd name="connsiteY17" fmla="*/ 918634 h 1388534"/>
+                <a:gd name="connsiteX18" fmla="*/ 150983 w 1218556"/>
+                <a:gd name="connsiteY18" fmla="*/ 1011767 h 1388534"/>
+                <a:gd name="connsiteX19" fmla="*/ 197549 w 1218556"/>
+                <a:gd name="connsiteY19" fmla="*/ 1104900 h 1388534"/>
+                <a:gd name="connsiteX20" fmla="*/ 222949 w 1218556"/>
+                <a:gd name="connsiteY20" fmla="*/ 1138767 h 1388534"/>
+                <a:gd name="connsiteX21" fmla="*/ 294916 w 1218556"/>
+                <a:gd name="connsiteY21" fmla="*/ 1244600 h 1388534"/>
+                <a:gd name="connsiteX22" fmla="*/ 341483 w 1218556"/>
+                <a:gd name="connsiteY22" fmla="*/ 1282700 h 1388534"/>
+                <a:gd name="connsiteX23" fmla="*/ 383816 w 1218556"/>
+                <a:gd name="connsiteY23" fmla="*/ 1325034 h 1388534"/>
+                <a:gd name="connsiteX24" fmla="*/ 472716 w 1218556"/>
+                <a:gd name="connsiteY24" fmla="*/ 1375834 h 1388534"/>
+                <a:gd name="connsiteX25" fmla="*/ 536216 w 1218556"/>
+                <a:gd name="connsiteY25" fmla="*/ 1388534 h 1388534"/>
+                <a:gd name="connsiteX26" fmla="*/ 692849 w 1218556"/>
+                <a:gd name="connsiteY26" fmla="*/ 1384300 h 1388534"/>
+                <a:gd name="connsiteX27" fmla="*/ 828316 w 1218556"/>
+                <a:gd name="connsiteY27" fmla="*/ 1354667 h 1388534"/>
+                <a:gd name="connsiteX28" fmla="*/ 976483 w 1218556"/>
+                <a:gd name="connsiteY28" fmla="*/ 1270000 h 1388534"/>
+                <a:gd name="connsiteX29" fmla="*/ 1120416 w 1218556"/>
+                <a:gd name="connsiteY29" fmla="*/ 1130300 h 1388534"/>
+                <a:gd name="connsiteX30" fmla="*/ 1166983 w 1218556"/>
+                <a:gd name="connsiteY30" fmla="*/ 1066800 h 1388534"/>
+                <a:gd name="connsiteX31" fmla="*/ 1179683 w 1218556"/>
+                <a:gd name="connsiteY31" fmla="*/ 1045634 h 1388534"/>
+                <a:gd name="connsiteX32" fmla="*/ 1213549 w 1218556"/>
+                <a:gd name="connsiteY32" fmla="*/ 910167 h 1388534"/>
+                <a:gd name="connsiteX33" fmla="*/ 1213549 w 1218556"/>
+                <a:gd name="connsiteY33" fmla="*/ 745067 h 1388534"/>
+                <a:gd name="connsiteX34" fmla="*/ 1200849 w 1218556"/>
+                <a:gd name="connsiteY34" fmla="*/ 715434 h 1388534"/>
+                <a:gd name="connsiteX35" fmla="*/ 1183916 w 1218556"/>
+                <a:gd name="connsiteY35" fmla="*/ 660400 h 1388534"/>
+                <a:gd name="connsiteX36" fmla="*/ 1158516 w 1218556"/>
+                <a:gd name="connsiteY36" fmla="*/ 601134 h 1388534"/>
+                <a:gd name="connsiteX37" fmla="*/ 1133116 w 1218556"/>
+                <a:gd name="connsiteY37" fmla="*/ 558800 h 1388534"/>
+                <a:gd name="connsiteX38" fmla="*/ 1103483 w 1218556"/>
+                <a:gd name="connsiteY38" fmla="*/ 478367 h 1388534"/>
+                <a:gd name="connsiteX39" fmla="*/ 1086549 w 1218556"/>
+                <a:gd name="connsiteY39" fmla="*/ 461434 h 1388534"/>
+              </a:gdLst>
+              <a:ahLst/>
+              <a:cxnLst>
+                <a:cxn ang="0">
+                  <a:pos x="connsiteX0" y="connsiteY0"/>
+                </a:cxn>
+                <a:cxn ang="0">
+                  <a:pos x="connsiteX1" y="connsiteY1"/>
+                </a:cxn>
+                <a:cxn ang="0">
+                  <a:pos x="connsiteX2" y="connsiteY2"/>
+                </a:cxn>
+                <a:cxn ang="0">
+                  <a:pos x="connsiteX3" y="connsiteY3"/>
+                </a:cxn>
+                <a:cxn ang="0">
+                  <a:pos x="connsiteX4" y="connsiteY4"/>
+                </a:cxn>
+                <a:cxn ang="0">
+                  <a:pos x="connsiteX5" y="connsiteY5"/>
+                </a:cxn>
+                <a:cxn ang="0">
+                  <a:pos x="connsiteX6" y="connsiteY6"/>
+                </a:cxn>
+                <a:cxn ang="0">
+                  <a:pos x="connsiteX7" y="connsiteY7"/>
+                </a:cxn>
+                <a:cxn ang="0">
+                  <a:pos x="connsiteX8" y="connsiteY8"/>
+                </a:cxn>
+                <a:cxn ang="0">
+                  <a:pos x="connsiteX9" y="connsiteY9"/>
+                </a:cxn>
+                <a:cxn ang="0">
+                  <a:pos x="connsiteX10" y="connsiteY10"/>
+                </a:cxn>
+                <a:cxn ang="0">
+                  <a:pos x="connsiteX11" y="connsiteY11"/>
+                </a:cxn>
+                <a:cxn ang="0">
+                  <a:pos x="connsiteX12" y="connsiteY12"/>
+                </a:cxn>
+                <a:cxn ang="0">
+                  <a:pos x="connsiteX13" y="connsiteY13"/>
+                </a:cxn>
+                <a:cxn ang="0">
+                  <a:pos x="connsiteX14" y="connsiteY14"/>
+                </a:cxn>
+                <a:cxn ang="0">
+                  <a:pos x="connsiteX15" y="connsiteY15"/>
+                </a:cxn>
+                <a:cxn ang="0">
+                  <a:pos x="connsiteX16" y="connsiteY16"/>
+                </a:cxn>
+                <a:cxn ang="0">
+                  <a:pos x="connsiteX17" y="connsiteY17"/>
+                </a:cxn>
+                <a:cxn ang="0">
+                  <a:pos x="connsiteX18" y="connsiteY18"/>
+                </a:cxn>
+                <a:cxn ang="0">
+                  <a:pos x="connsiteX19" y="connsiteY19"/>
+                </a:cxn>
+                <a:cxn ang="0">
+                  <a:pos x="connsiteX20" y="connsiteY20"/>
+                </a:cxn>
+                <a:cxn ang="0">
+                  <a:pos x="connsiteX21" y="connsiteY21"/>
+                </a:cxn>
+                <a:cxn ang="0">
+                  <a:pos x="connsiteX22" y="connsiteY22"/>
+                </a:cxn>
+                <a:cxn ang="0">
+                  <a:pos x="connsiteX23" y="connsiteY23"/>
+                </a:cxn>
+                <a:cxn ang="0">
+                  <a:pos x="connsiteX24" y="connsiteY24"/>
+                </a:cxn>
+                <a:cxn ang="0">
+                  <a:pos x="connsiteX25" y="connsiteY25"/>
+                </a:cxn>
+                <a:cxn ang="0">
+                  <a:pos x="connsiteX26" y="connsiteY26"/>
+                </a:cxn>
+                <a:cxn ang="0">
+                  <a:pos x="connsiteX27" y="connsiteY27"/>
+                </a:cxn>
+                <a:cxn ang="0">
+                  <a:pos x="connsiteX28" y="connsiteY28"/>
+                </a:cxn>
+                <a:cxn ang="0">
+                  <a:pos x="connsiteX29" y="connsiteY29"/>
+                </a:cxn>
+                <a:cxn ang="0">
+                  <a:pos x="connsiteX30" y="connsiteY30"/>
+                </a:cxn>
+                <a:cxn ang="0">
+                  <a:pos x="connsiteX31" y="connsiteY31"/>
+                </a:cxn>
+                <a:cxn ang="0">
+                  <a:pos x="connsiteX32" y="connsiteY32"/>
+                </a:cxn>
+                <a:cxn ang="0">
+                  <a:pos x="connsiteX33" y="connsiteY33"/>
+                </a:cxn>
+                <a:cxn ang="0">
+                  <a:pos x="connsiteX34" y="connsiteY34"/>
+                </a:cxn>
+                <a:cxn ang="0">
+                  <a:pos x="connsiteX35" y="connsiteY35"/>
+                </a:cxn>
+                <a:cxn ang="0">
+                  <a:pos x="connsiteX36" y="connsiteY36"/>
+                </a:cxn>
+                <a:cxn ang="0">
+                  <a:pos x="connsiteX37" y="connsiteY37"/>
+                </a:cxn>
+                <a:cxn ang="0">
+                  <a:pos x="connsiteX38" y="connsiteY38"/>
+                </a:cxn>
+                <a:cxn ang="0">
+                  <a:pos x="connsiteX39" y="connsiteY39"/>
+                </a:cxn>
+              </a:cxnLst>
+              <a:rect l="l" t="t" r="r" b="b"/>
+              <a:pathLst>
+                <a:path w="1218556" h="1388534">
+                  <a:moveTo>
+                    <a:pt x="1086549" y="461434"/>
+                  </a:moveTo>
+                  <a:cubicBezTo>
+                    <a:pt x="1076671" y="436034"/>
+                    <a:pt x="1096400" y="432422"/>
+                    <a:pt x="1044216" y="325967"/>
+                  </a:cubicBezTo>
+                  <a:cubicBezTo>
+                    <a:pt x="1026958" y="290762"/>
+                    <a:pt x="1005552" y="257725"/>
+                    <a:pt x="984949" y="224367"/>
+                  </a:cubicBezTo>
+                  <a:cubicBezTo>
+                    <a:pt x="975898" y="209712"/>
+                    <a:pt x="968548" y="193061"/>
+                    <a:pt x="955316" y="182034"/>
+                  </a:cubicBezTo>
+                  <a:cubicBezTo>
+                    <a:pt x="892404" y="129607"/>
+                    <a:pt x="833965" y="93311"/>
+                    <a:pt x="760583" y="63500"/>
+                  </a:cubicBezTo>
+                  <a:cubicBezTo>
+                    <a:pt x="708925" y="42514"/>
+                    <a:pt x="658846" y="32657"/>
+                    <a:pt x="603949" y="21167"/>
+                  </a:cubicBezTo>
+                  <a:cubicBezTo>
+                    <a:pt x="514142" y="2370"/>
+                    <a:pt x="536219" y="5998"/>
+                    <a:pt x="464249" y="0"/>
+                  </a:cubicBezTo>
+                  <a:cubicBezTo>
+                    <a:pt x="441671" y="2822"/>
+                    <a:pt x="418744" y="3605"/>
+                    <a:pt x="396516" y="8467"/>
+                  </a:cubicBezTo>
+                  <a:cubicBezTo>
+                    <a:pt x="373408" y="13522"/>
+                    <a:pt x="351499" y="23039"/>
+                    <a:pt x="328783" y="29634"/>
+                  </a:cubicBezTo>
+                  <a:cubicBezTo>
+                    <a:pt x="307745" y="35742"/>
+                    <a:pt x="286450" y="40923"/>
+                    <a:pt x="265283" y="46567"/>
+                  </a:cubicBezTo>
+                  <a:cubicBezTo>
+                    <a:pt x="249761" y="55034"/>
+                    <a:pt x="233355" y="62051"/>
+                    <a:pt x="218716" y="71967"/>
+                  </a:cubicBezTo>
+                  <a:cubicBezTo>
+                    <a:pt x="158556" y="112721"/>
+                    <a:pt x="111955" y="147050"/>
+                    <a:pt x="70549" y="207434"/>
+                  </a:cubicBezTo>
+                  <a:cubicBezTo>
+                    <a:pt x="35014" y="259256"/>
+                    <a:pt x="28357" y="297548"/>
+                    <a:pt x="11283" y="355600"/>
+                  </a:cubicBezTo>
+                  <a:cubicBezTo>
+                    <a:pt x="-2712" y="467560"/>
+                    <a:pt x="-4775" y="453250"/>
+                    <a:pt x="11283" y="613834"/>
+                  </a:cubicBezTo>
+                  <a:cubicBezTo>
+                    <a:pt x="13463" y="635632"/>
+                    <a:pt x="21434" y="656504"/>
+                    <a:pt x="28216" y="677334"/>
+                  </a:cubicBezTo>
+                  <a:cubicBezTo>
+                    <a:pt x="41205" y="717228"/>
+                    <a:pt x="52967" y="757773"/>
+                    <a:pt x="70549" y="795867"/>
+                  </a:cubicBezTo>
+                  <a:cubicBezTo>
+                    <a:pt x="79016" y="814211"/>
+                    <a:pt x="89363" y="831800"/>
+                    <a:pt x="95949" y="850900"/>
+                  </a:cubicBezTo>
+                  <a:cubicBezTo>
+                    <a:pt x="103536" y="872902"/>
+                    <a:pt x="105985" y="896407"/>
+                    <a:pt x="112883" y="918634"/>
+                  </a:cubicBezTo>
+                  <a:cubicBezTo>
+                    <a:pt x="119368" y="939531"/>
+                    <a:pt x="139975" y="989018"/>
+                    <a:pt x="150983" y="1011767"/>
+                  </a:cubicBezTo>
+                  <a:cubicBezTo>
+                    <a:pt x="166101" y="1043010"/>
+                    <a:pt x="176724" y="1077133"/>
+                    <a:pt x="197549" y="1104900"/>
+                  </a:cubicBezTo>
+                  <a:cubicBezTo>
+                    <a:pt x="206016" y="1116189"/>
+                    <a:pt x="215259" y="1126936"/>
+                    <a:pt x="222949" y="1138767"/>
+                  </a:cubicBezTo>
+                  <a:cubicBezTo>
+                    <a:pt x="255391" y="1188677"/>
+                    <a:pt x="251083" y="1198680"/>
+                    <a:pt x="294916" y="1244600"/>
+                  </a:cubicBezTo>
+                  <a:cubicBezTo>
+                    <a:pt x="308764" y="1259107"/>
+                    <a:pt x="326611" y="1269244"/>
+                    <a:pt x="341483" y="1282700"/>
+                  </a:cubicBezTo>
+                  <a:cubicBezTo>
+                    <a:pt x="356281" y="1296089"/>
+                    <a:pt x="368305" y="1312478"/>
+                    <a:pt x="383816" y="1325034"/>
+                  </a:cubicBezTo>
+                  <a:cubicBezTo>
+                    <a:pt x="397300" y="1335950"/>
+                    <a:pt x="453708" y="1369752"/>
+                    <a:pt x="472716" y="1375834"/>
+                  </a:cubicBezTo>
+                  <a:cubicBezTo>
+                    <a:pt x="493275" y="1382413"/>
+                    <a:pt x="515049" y="1384301"/>
+                    <a:pt x="536216" y="1388534"/>
+                  </a:cubicBezTo>
+                  <a:cubicBezTo>
+                    <a:pt x="588427" y="1387123"/>
+                    <a:pt x="640717" y="1387492"/>
+                    <a:pt x="692849" y="1384300"/>
+                  </a:cubicBezTo>
+                  <a:cubicBezTo>
+                    <a:pt x="722617" y="1382477"/>
+                    <a:pt x="811262" y="1360636"/>
+                    <a:pt x="828316" y="1354667"/>
+                  </a:cubicBezTo>
+                  <a:cubicBezTo>
+                    <a:pt x="899127" y="1329883"/>
+                    <a:pt x="920079" y="1314439"/>
+                    <a:pt x="976483" y="1270000"/>
+                  </a:cubicBezTo>
+                  <a:cubicBezTo>
+                    <a:pt x="1048551" y="1213219"/>
+                    <a:pt x="1061798" y="1201944"/>
+                    <a:pt x="1120416" y="1130300"/>
+                  </a:cubicBezTo>
+                  <a:cubicBezTo>
+                    <a:pt x="1137037" y="1109985"/>
+                    <a:pt x="1151930" y="1088303"/>
+                    <a:pt x="1166983" y="1066800"/>
+                  </a:cubicBezTo>
+                  <a:cubicBezTo>
+                    <a:pt x="1171701" y="1060059"/>
+                    <a:pt x="1176235" y="1053105"/>
+                    <a:pt x="1179683" y="1045634"/>
+                  </a:cubicBezTo>
+                  <a:cubicBezTo>
+                    <a:pt x="1199371" y="1002976"/>
+                    <a:pt x="1205912" y="955995"/>
+                    <a:pt x="1213549" y="910167"/>
+                  </a:cubicBezTo>
+                  <a:cubicBezTo>
+                    <a:pt x="1217751" y="847151"/>
+                    <a:pt x="1222321" y="813048"/>
+                    <a:pt x="1213549" y="745067"/>
+                  </a:cubicBezTo>
+                  <a:cubicBezTo>
+                    <a:pt x="1212174" y="734409"/>
+                    <a:pt x="1204707" y="725464"/>
+                    <a:pt x="1200849" y="715434"/>
+                  </a:cubicBezTo>
+                  <a:cubicBezTo>
+                    <a:pt x="1188998" y="684619"/>
+                    <a:pt x="1194993" y="693629"/>
+                    <a:pt x="1183916" y="660400"/>
+                  </a:cubicBezTo>
+                  <a:cubicBezTo>
+                    <a:pt x="1176452" y="638009"/>
+                    <a:pt x="1169887" y="621349"/>
+                    <a:pt x="1158516" y="601134"/>
+                  </a:cubicBezTo>
+                  <a:cubicBezTo>
+                    <a:pt x="1150448" y="586791"/>
+                    <a:pt x="1133116" y="558800"/>
+                    <a:pt x="1133116" y="558800"/>
+                  </a:cubicBezTo>
+                  <a:cubicBezTo>
+                    <a:pt x="1125718" y="521809"/>
+                    <a:pt x="1128580" y="528561"/>
+                    <a:pt x="1103483" y="478367"/>
+                  </a:cubicBezTo>
+                  <a:cubicBezTo>
+                    <a:pt x="1089372" y="450145"/>
+                    <a:pt x="1096427" y="486834"/>
+                    <a:pt x="1086549" y="461434"/>
+                  </a:cubicBezTo>
+                  <a:close/>
+                </a:path>
+              </a:pathLst>
+            </a:custGeom>
+            <a:noFill/>
+            <a:ln w="38100">
+              <a:solidFill>
+                <a:srgbClr val="FFFF00"/>
+              </a:solidFill>
+            </a:ln>
+          </p:spPr>
+          <p:style>
+            <a:lnRef idx="2">
+              <a:schemeClr val="accent1">
+                <a:shade val="50000"/>
+              </a:schemeClr>
+            </a:lnRef>
+            <a:fillRef idx="1">
+              <a:schemeClr val="accent1"/>
+            </a:fillRef>
+            <a:effectRef idx="0">
+              <a:schemeClr val="accent1"/>
+            </a:effectRef>
+            <a:fontRef idx="minor">
+              <a:schemeClr val="lt1"/>
+            </a:fontRef>
+          </p:style>
+          <p:txBody>
+            <a:bodyPr rtlCol="0" anchor="ctr"/>
+            <a:lstStyle/>
+            <a:p>
+              <a:pPr algn="ctr"/>
+              <a:endParaRPr lang="en-DE"/>
+            </a:p>
+          </p:txBody>
+        </p:sp>
+      </p:grpSp>
+    </p:spTree>
+    <p:extLst>
+      <p:ext uri="{BB962C8B-B14F-4D97-AF65-F5344CB8AC3E}">
+        <p14:creationId xmlns:p14="http://schemas.microsoft.com/office/powerpoint/2010/main" val="2007443099"/>
+      </p:ext>
+    </p:extLst>
+  </p:cSld>
+  <p:clrMapOvr>
+    <a:masterClrMapping/>
+  </p:clrMapOvr>
+</p:sld>
+</file>
+
 <file path=ppt/theme/theme1.xml><?xml version="1.0" encoding="utf-8"?>
 <a:theme xmlns:a="http://schemas.openxmlformats.org/drawingml/2006/main" name="Office Theme">
   <a:themeElements>

</xml_diff>